<commit_message>
Updated session 4 slides
- updated text of most slides to make it more concise
- increased line spacing
- highlighted key concepts with bold characters
- highlighted puzzle slides with a different background
</commit_message>
<xml_diff>
--- a/session_four/session_four_presentation.pptx
+++ b/session_four/session_four_presentation.pptx
@@ -178,10 +178,7 @@
 <file path=ppt/revisionInfo.xml><?xml version="1.0" encoding="utf-8"?>
 <p1510:revInfo xmlns:a="http://schemas.openxmlformats.org/drawingml/2006/main" xmlns:r="http://schemas.openxmlformats.org/officeDocument/2006/relationships" xmlns:p1510="http://schemas.microsoft.com/office/powerpoint/2015/10/main">
   <p1510:revLst>
-    <p1510:client id="{313504FF-247F-4D85-B376-AFBE2DA20541}" v="31" dt="2020-03-19T11:07:49.586"/>
-    <p1510:client id="{458AD232-5E99-4B9F-84B9-A2E5BA4533E2}" v="1" dt="2020-03-19T10:10:07.659"/>
-    <p1510:client id="{97567A43-06CF-43EB-8DE1-C288925FE876}" v="635" dt="2020-03-18T15:07:16.218"/>
-    <p1510:client id="{F4A4F6B3-72F9-4822-8E52-DDD660AB8108}" v="2" dt="2020-03-19T12:29:58.308"/>
+    <p1510:client id="{0DCF6245-685A-46A6-B416-3AF283E3E215}" v="42" dt="2024-03-25T09:33:02.273"/>
   </p1510:revLst>
 </p1510:revInfo>
 </file>
@@ -189,44 +186,19 @@
 <file path=ppt/changesInfos/changesInfo1.xml><?xml version="1.0" encoding="utf-8"?>
 <pc:chgInfo xmlns:a="http://schemas.openxmlformats.org/drawingml/2006/main" xmlns:r="http://schemas.openxmlformats.org/officeDocument/2006/relationships" xmlns:ac="http://schemas.microsoft.com/office/drawing/2013/main/command" xmlns:pc="http://schemas.microsoft.com/office/powerpoint/2013/main/command">
   <pc:docChgLst>
-    <pc:chgData name="McKinney, David" userId="S::kqkh779@astrazeneca.net::8b945cb3-78ce-42d7-adc5-b07bab32cd5b" providerId="AD" clId="Web-{458AD232-5E99-4B9F-84B9-A2E5BA4533E2}"/>
-    <pc:docChg chg="addSld">
-      <pc:chgData name="McKinney, David" userId="S::kqkh779@astrazeneca.net::8b945cb3-78ce-42d7-adc5-b07bab32cd5b" providerId="AD" clId="Web-{458AD232-5E99-4B9F-84B9-A2E5BA4533E2}" dt="2020-03-19T10:10:07.659" v="0"/>
+    <pc:chgData name="Whittaker, Ryan" userId="S::kbqc931@astrazeneca.net::873b3a98-b8cc-426f-9da0-8dcfa40dc643" providerId="AD" clId="Web-{2632E73B-7AF1-4FEF-AC15-A6FF3B03BA1F}"/>
+    <pc:docChg chg="sldOrd">
+      <pc:chgData name="Whittaker, Ryan" userId="S::kbqc931@astrazeneca.net::873b3a98-b8cc-426f-9da0-8dcfa40dc643" providerId="AD" clId="Web-{2632E73B-7AF1-4FEF-AC15-A6FF3B03BA1F}" dt="2020-02-10T15:28:36.667" v="1"/>
       <pc:docMkLst>
         <pc:docMk/>
       </pc:docMkLst>
-      <pc:sldChg chg="add replId">
-        <pc:chgData name="McKinney, David" userId="S::kqkh779@astrazeneca.net::8b945cb3-78ce-42d7-adc5-b07bab32cd5b" providerId="AD" clId="Web-{458AD232-5E99-4B9F-84B9-A2E5BA4533E2}" dt="2020-03-19T10:10:07.659" v="0"/>
+      <pc:sldChg chg="ord">
+        <pc:chgData name="Whittaker, Ryan" userId="S::kbqc931@astrazeneca.net::873b3a98-b8cc-426f-9da0-8dcfa40dc643" providerId="AD" clId="Web-{2632E73B-7AF1-4FEF-AC15-A6FF3B03BA1F}" dt="2020-02-10T15:28:36.667" v="1"/>
         <pc:sldMkLst>
           <pc:docMk/>
-          <pc:sldMk cId="2207696395" sldId="408"/>
+          <pc:sldMk cId="2729279789" sldId="402"/>
         </pc:sldMkLst>
       </pc:sldChg>
-    </pc:docChg>
-  </pc:docChgLst>
-  <pc:docChgLst>
-    <pc:chgData name="McKinney, David" userId="S::kqkh779@astrazeneca.net::8b945cb3-78ce-42d7-adc5-b07bab32cd5b" providerId="AD" clId="Web-{F4A4F6B3-72F9-4822-8E52-DDD660AB8108}"/>
-    <pc:docChg chg="modSld">
-      <pc:chgData name="McKinney, David" userId="S::kqkh779@astrazeneca.net::8b945cb3-78ce-42d7-adc5-b07bab32cd5b" providerId="AD" clId="Web-{F4A4F6B3-72F9-4822-8E52-DDD660AB8108}" dt="2020-03-19T12:29:58.308" v="1"/>
-      <pc:docMkLst>
-        <pc:docMk/>
-      </pc:docMkLst>
-      <pc:sldChg chg="addAnim modAnim">
-        <pc:chgData name="McKinney, David" userId="S::kqkh779@astrazeneca.net::8b945cb3-78ce-42d7-adc5-b07bab32cd5b" providerId="AD" clId="Web-{F4A4F6B3-72F9-4822-8E52-DDD660AB8108}" dt="2020-03-19T12:29:58.308" v="1"/>
-        <pc:sldMkLst>
-          <pc:docMk/>
-          <pc:sldMk cId="1416124321" sldId="400"/>
-        </pc:sldMkLst>
-      </pc:sldChg>
-    </pc:docChg>
-  </pc:docChgLst>
-  <pc:docChgLst>
-    <pc:chgData name="McKinney, David" userId="8b945cb3-78ce-42d7-adc5-b07bab32cd5b" providerId="ADAL" clId="{9EB86574-343D-42EA-B9EC-CCCDCC46014A}"/>
-    <pc:docChg chg="addSld delSld modSld">
-      <pc:chgData name="McKinney, David" userId="8b945cb3-78ce-42d7-adc5-b07bab32cd5b" providerId="ADAL" clId="{9EB86574-343D-42EA-B9EC-CCCDCC46014A}" dt="2020-02-21T17:29:46.879" v="1" actId="2696"/>
-      <pc:docMkLst>
-        <pc:docMk/>
-      </pc:docMkLst>
     </pc:docChg>
   </pc:docChgLst>
   <pc:docChgLst>
@@ -737,6 +709,548 @@
             <ac:picMk id="8" creationId="{2098DAF1-BC6F-4E7C-B758-93661700F0C7}"/>
           </ac:picMkLst>
         </pc:picChg>
+      </pc:sldChg>
+    </pc:docChg>
+  </pc:docChgLst>
+  <pc:docChgLst>
+    <pc:chgData name="McKinney, David" userId="S::kqkh779@astrazeneca.net::8b945cb3-78ce-42d7-adc5-b07bab32cd5b" providerId="AD" clId="Web-{943D79A7-4F12-443F-BB18-E65E88C7EB45}"/>
+    <pc:docChg chg="modSld">
+      <pc:chgData name="McKinney, David" userId="S::kqkh779@astrazeneca.net::8b945cb3-78ce-42d7-adc5-b07bab32cd5b" providerId="AD" clId="Web-{943D79A7-4F12-443F-BB18-E65E88C7EB45}" dt="2020-02-21T16:31:49.586" v="1"/>
+      <pc:docMkLst>
+        <pc:docMk/>
+      </pc:docMkLst>
+      <pc:sldChg chg="addSp delSp modSp">
+        <pc:chgData name="McKinney, David" userId="S::kqkh779@astrazeneca.net::8b945cb3-78ce-42d7-adc5-b07bab32cd5b" providerId="AD" clId="Web-{943D79A7-4F12-443F-BB18-E65E88C7EB45}" dt="2020-02-21T16:31:49.586" v="1"/>
+        <pc:sldMkLst>
+          <pc:docMk/>
+          <pc:sldMk cId="1416647349" sldId="404"/>
+        </pc:sldMkLst>
+        <pc:picChg chg="add del mod">
+          <ac:chgData name="McKinney, David" userId="S::kqkh779@astrazeneca.net::8b945cb3-78ce-42d7-adc5-b07bab32cd5b" providerId="AD" clId="Web-{943D79A7-4F12-443F-BB18-E65E88C7EB45}" dt="2020-02-21T16:31:49.586" v="1"/>
+          <ac:picMkLst>
+            <pc:docMk/>
+            <pc:sldMk cId="1416647349" sldId="404"/>
+            <ac:picMk id="7" creationId="{ADC23ABF-9E9F-406C-BF99-C7710FFD1480}"/>
+          </ac:picMkLst>
+        </pc:picChg>
+      </pc:sldChg>
+    </pc:docChg>
+  </pc:docChgLst>
+  <pc:docChgLst>
+    <pc:chgData name="Francescatto, Margherita" userId="8dce2127-3ed7-41e9-a69d-639dab6d0671" providerId="ADAL" clId="{0DCF6245-685A-46A6-B416-3AF283E3E215}"/>
+    <pc:docChg chg="undo custSel modSld">
+      <pc:chgData name="Francescatto, Margherita" userId="8dce2127-3ed7-41e9-a69d-639dab6d0671" providerId="ADAL" clId="{0DCF6245-685A-46A6-B416-3AF283E3E215}" dt="2024-03-25T09:34:01.609" v="1280" actId="20577"/>
+      <pc:docMkLst>
+        <pc:docMk/>
+      </pc:docMkLst>
+      <pc:sldChg chg="addSp delSp modSp mod">
+        <pc:chgData name="Francescatto, Margherita" userId="8dce2127-3ed7-41e9-a69d-639dab6d0671" providerId="ADAL" clId="{0DCF6245-685A-46A6-B416-3AF283E3E215}" dt="2024-03-25T09:33:02.273" v="1253"/>
+        <pc:sldMkLst>
+          <pc:docMk/>
+          <pc:sldMk cId="211931337" sldId="359"/>
+        </pc:sldMkLst>
+        <pc:spChg chg="add del mod">
+          <ac:chgData name="Francescatto, Margherita" userId="8dce2127-3ed7-41e9-a69d-639dab6d0671" providerId="ADAL" clId="{0DCF6245-685A-46A6-B416-3AF283E3E215}" dt="2024-03-22T12:49:40.750" v="45"/>
+          <ac:spMkLst>
+            <pc:docMk/>
+            <pc:sldMk cId="211931337" sldId="359"/>
+            <ac:spMk id="3" creationId="{D6FABE79-FDB0-2A7F-DDB5-CDE7B95D0C24}"/>
+          </ac:spMkLst>
+        </pc:spChg>
+        <pc:spChg chg="add del mod">
+          <ac:chgData name="Francescatto, Margherita" userId="8dce2127-3ed7-41e9-a69d-639dab6d0671" providerId="ADAL" clId="{0DCF6245-685A-46A6-B416-3AF283E3E215}" dt="2024-03-22T12:49:40.765" v="50"/>
+          <ac:spMkLst>
+            <pc:docMk/>
+            <pc:sldMk cId="211931337" sldId="359"/>
+            <ac:spMk id="4" creationId="{BF318503-6D3E-898B-4206-C47620D0E21F}"/>
+          </ac:spMkLst>
+        </pc:spChg>
+        <pc:spChg chg="add del mod">
+          <ac:chgData name="Francescatto, Margherita" userId="8dce2127-3ed7-41e9-a69d-639dab6d0671" providerId="ADAL" clId="{0DCF6245-685A-46A6-B416-3AF283E3E215}" dt="2024-03-22T12:49:40.778" v="55"/>
+          <ac:spMkLst>
+            <pc:docMk/>
+            <pc:sldMk cId="211931337" sldId="359"/>
+            <ac:spMk id="5" creationId="{D4A46D47-7611-8325-210C-A70332D80E7A}"/>
+          </ac:spMkLst>
+        </pc:spChg>
+        <pc:spChg chg="add del mod">
+          <ac:chgData name="Francescatto, Margherita" userId="8dce2127-3ed7-41e9-a69d-639dab6d0671" providerId="ADAL" clId="{0DCF6245-685A-46A6-B416-3AF283E3E215}" dt="2024-03-22T12:49:40.791" v="60"/>
+          <ac:spMkLst>
+            <pc:docMk/>
+            <pc:sldMk cId="211931337" sldId="359"/>
+            <ac:spMk id="6" creationId="{AEBEA3D0-72ED-8A1E-4767-9BFFC266B074}"/>
+          </ac:spMkLst>
+        </pc:spChg>
+        <pc:spChg chg="add del mod">
+          <ac:chgData name="Francescatto, Margherita" userId="8dce2127-3ed7-41e9-a69d-639dab6d0671" providerId="ADAL" clId="{0DCF6245-685A-46A6-B416-3AF283E3E215}" dt="2024-03-22T12:49:40.804" v="65"/>
+          <ac:spMkLst>
+            <pc:docMk/>
+            <pc:sldMk cId="211931337" sldId="359"/>
+            <ac:spMk id="7" creationId="{609ADF18-4EE0-651A-F1D7-BD57AC270587}"/>
+          </ac:spMkLst>
+        </pc:spChg>
+        <pc:spChg chg="add del mod">
+          <ac:chgData name="Francescatto, Margherita" userId="8dce2127-3ed7-41e9-a69d-639dab6d0671" providerId="ADAL" clId="{0DCF6245-685A-46A6-B416-3AF283E3E215}" dt="2024-03-22T12:49:40.819" v="70"/>
+          <ac:spMkLst>
+            <pc:docMk/>
+            <pc:sldMk cId="211931337" sldId="359"/>
+            <ac:spMk id="8" creationId="{A8DF2624-52B2-8FCA-966D-609CDBB19448}"/>
+          </ac:spMkLst>
+        </pc:spChg>
+        <pc:spChg chg="add del mod">
+          <ac:chgData name="Francescatto, Margherita" userId="8dce2127-3ed7-41e9-a69d-639dab6d0671" providerId="ADAL" clId="{0DCF6245-685A-46A6-B416-3AF283E3E215}" dt="2024-03-22T12:49:40.832" v="75"/>
+          <ac:spMkLst>
+            <pc:docMk/>
+            <pc:sldMk cId="211931337" sldId="359"/>
+            <ac:spMk id="10" creationId="{D4D0FB29-29E8-712D-DCF0-06E04DE0AB7F}"/>
+          </ac:spMkLst>
+        </pc:spChg>
+        <pc:spChg chg="add del mod">
+          <ac:chgData name="Francescatto, Margherita" userId="8dce2127-3ed7-41e9-a69d-639dab6d0671" providerId="ADAL" clId="{0DCF6245-685A-46A6-B416-3AF283E3E215}" dt="2024-03-22T12:49:40.846" v="80"/>
+          <ac:spMkLst>
+            <pc:docMk/>
+            <pc:sldMk cId="211931337" sldId="359"/>
+            <ac:spMk id="11" creationId="{3B319548-AD09-F5C9-833B-FD381208CD19}"/>
+          </ac:spMkLst>
+        </pc:spChg>
+        <pc:spChg chg="mod">
+          <ac:chgData name="Francescatto, Margherita" userId="8dce2127-3ed7-41e9-a69d-639dab6d0671" providerId="ADAL" clId="{0DCF6245-685A-46A6-B416-3AF283E3E215}" dt="2024-03-25T09:28:26.539" v="1252"/>
+          <ac:spMkLst>
+            <pc:docMk/>
+            <pc:sldMk cId="211931337" sldId="359"/>
+            <ac:spMk id="16" creationId="{6220F8D2-33B8-4FEE-9932-C559DEECD523}"/>
+          </ac:spMkLst>
+        </pc:spChg>
+        <pc:spChg chg="mod">
+          <ac:chgData name="Francescatto, Margherita" userId="8dce2127-3ed7-41e9-a69d-639dab6d0671" providerId="ADAL" clId="{0DCF6245-685A-46A6-B416-3AF283E3E215}" dt="2024-03-25T09:33:02.273" v="1253"/>
+          <ac:spMkLst>
+            <pc:docMk/>
+            <pc:sldMk cId="211931337" sldId="359"/>
+            <ac:spMk id="17" creationId="{9CEDB4F5-F9DD-47DC-A256-10DDF5DDC1D5}"/>
+          </ac:spMkLst>
+        </pc:spChg>
+        <pc:spChg chg="add del mod">
+          <ac:chgData name="Francescatto, Margherita" userId="8dce2127-3ed7-41e9-a69d-639dab6d0671" providerId="ADAL" clId="{0DCF6245-685A-46A6-B416-3AF283E3E215}" dt="2024-03-22T12:49:40.860" v="85"/>
+          <ac:spMkLst>
+            <pc:docMk/>
+            <pc:sldMk cId="211931337" sldId="359"/>
+            <ac:spMk id="18" creationId="{DCAC854E-9290-9633-255F-839C0A92036A}"/>
+          </ac:spMkLst>
+        </pc:spChg>
+        <pc:spChg chg="add del mod">
+          <ac:chgData name="Francescatto, Margherita" userId="8dce2127-3ed7-41e9-a69d-639dab6d0671" providerId="ADAL" clId="{0DCF6245-685A-46A6-B416-3AF283E3E215}" dt="2024-03-22T12:49:40.873" v="90"/>
+          <ac:spMkLst>
+            <pc:docMk/>
+            <pc:sldMk cId="211931337" sldId="359"/>
+            <ac:spMk id="19" creationId="{108A3A75-94B1-87EB-D7DA-54F65808A667}"/>
+          </ac:spMkLst>
+        </pc:spChg>
+      </pc:sldChg>
+      <pc:sldChg chg="modSp mod">
+        <pc:chgData name="Francescatto, Margherita" userId="8dce2127-3ed7-41e9-a69d-639dab6d0671" providerId="ADAL" clId="{0DCF6245-685A-46A6-B416-3AF283E3E215}" dt="2024-03-22T12:49:10.670" v="40" actId="20577"/>
+        <pc:sldMkLst>
+          <pc:docMk/>
+          <pc:sldMk cId="2499478442" sldId="378"/>
+        </pc:sldMkLst>
+        <pc:spChg chg="mod">
+          <ac:chgData name="Francescatto, Margherita" userId="8dce2127-3ed7-41e9-a69d-639dab6d0671" providerId="ADAL" clId="{0DCF6245-685A-46A6-B416-3AF283E3E215}" dt="2024-03-22T12:49:10.670" v="40" actId="20577"/>
+          <ac:spMkLst>
+            <pc:docMk/>
+            <pc:sldMk cId="2499478442" sldId="378"/>
+            <ac:spMk id="9" creationId="{EFADBC8D-294D-4832-A9A1-5CC2FA0C5801}"/>
+          </ac:spMkLst>
+        </pc:spChg>
+      </pc:sldChg>
+      <pc:sldChg chg="modSp mod">
+        <pc:chgData name="Francescatto, Margherita" userId="8dce2127-3ed7-41e9-a69d-639dab6d0671" providerId="ADAL" clId="{0DCF6245-685A-46A6-B416-3AF283E3E215}" dt="2024-03-25T07:39:43.001" v="692" actId="20577"/>
+        <pc:sldMkLst>
+          <pc:docMk/>
+          <pc:sldMk cId="2122342213" sldId="398"/>
+        </pc:sldMkLst>
+        <pc:spChg chg="mod">
+          <ac:chgData name="Francescatto, Margherita" userId="8dce2127-3ed7-41e9-a69d-639dab6d0671" providerId="ADAL" clId="{0DCF6245-685A-46A6-B416-3AF283E3E215}" dt="2024-03-25T07:39:43.001" v="692" actId="20577"/>
+          <ac:spMkLst>
+            <pc:docMk/>
+            <pc:sldMk cId="2122342213" sldId="398"/>
+            <ac:spMk id="9" creationId="{4E42B628-8463-4E75-A5A1-234D3CBE4E01}"/>
+          </ac:spMkLst>
+        </pc:spChg>
+        <pc:picChg chg="mod">
+          <ac:chgData name="Francescatto, Margherita" userId="8dce2127-3ed7-41e9-a69d-639dab6d0671" providerId="ADAL" clId="{0DCF6245-685A-46A6-B416-3AF283E3E215}" dt="2024-03-22T13:14:53.560" v="366" actId="1076"/>
+          <ac:picMkLst>
+            <pc:docMk/>
+            <pc:sldMk cId="2122342213" sldId="398"/>
+            <ac:picMk id="7" creationId="{17DC542C-7CAE-462A-B897-09ADE0C8C270}"/>
+          </ac:picMkLst>
+        </pc:picChg>
+      </pc:sldChg>
+      <pc:sldChg chg="modSp mod setBg">
+        <pc:chgData name="Francescatto, Margherita" userId="8dce2127-3ed7-41e9-a69d-639dab6d0671" providerId="ADAL" clId="{0DCF6245-685A-46A6-B416-3AF283E3E215}" dt="2024-03-25T09:27:24.244" v="1249" actId="20577"/>
+        <pc:sldMkLst>
+          <pc:docMk/>
+          <pc:sldMk cId="1416647349" sldId="404"/>
+        </pc:sldMkLst>
+        <pc:spChg chg="mod">
+          <ac:chgData name="Francescatto, Margherita" userId="8dce2127-3ed7-41e9-a69d-639dab6d0671" providerId="ADAL" clId="{0DCF6245-685A-46A6-B416-3AF283E3E215}" dt="2024-03-25T09:27:24.244" v="1249" actId="20577"/>
+          <ac:spMkLst>
+            <pc:docMk/>
+            <pc:sldMk cId="1416647349" sldId="404"/>
+            <ac:spMk id="2" creationId="{44E4D7EA-B512-4529-A811-E20DD74F7C79}"/>
+          </ac:spMkLst>
+        </pc:spChg>
+        <pc:spChg chg="mod">
+          <ac:chgData name="Francescatto, Margherita" userId="8dce2127-3ed7-41e9-a69d-639dab6d0671" providerId="ADAL" clId="{0DCF6245-685A-46A6-B416-3AF283E3E215}" dt="2024-03-25T07:50:58.868" v="932" actId="948"/>
+          <ac:spMkLst>
+            <pc:docMk/>
+            <pc:sldMk cId="1416647349" sldId="404"/>
+            <ac:spMk id="9" creationId="{A5C22481-CBC1-4808-8EA9-14024618BB68}"/>
+          </ac:spMkLst>
+        </pc:spChg>
+      </pc:sldChg>
+      <pc:sldChg chg="modSp mod">
+        <pc:chgData name="Francescatto, Margherita" userId="8dce2127-3ed7-41e9-a69d-639dab6d0671" providerId="ADAL" clId="{0DCF6245-685A-46A6-B416-3AF283E3E215}" dt="2024-03-25T08:43:50.666" v="938" actId="20577"/>
+        <pc:sldMkLst>
+          <pc:docMk/>
+          <pc:sldMk cId="3446684734" sldId="423"/>
+        </pc:sldMkLst>
+        <pc:spChg chg="mod">
+          <ac:chgData name="Francescatto, Margherita" userId="8dce2127-3ed7-41e9-a69d-639dab6d0671" providerId="ADAL" clId="{0DCF6245-685A-46A6-B416-3AF283E3E215}" dt="2024-03-25T08:43:50.666" v="938" actId="20577"/>
+          <ac:spMkLst>
+            <pc:docMk/>
+            <pc:sldMk cId="3446684734" sldId="423"/>
+            <ac:spMk id="11" creationId="{825EE2FD-D59C-4D6F-93E9-415E324D68C1}"/>
+          </ac:spMkLst>
+        </pc:spChg>
+      </pc:sldChg>
+      <pc:sldChg chg="modSp mod">
+        <pc:chgData name="Francescatto, Margherita" userId="8dce2127-3ed7-41e9-a69d-639dab6d0671" providerId="ADAL" clId="{0DCF6245-685A-46A6-B416-3AF283E3E215}" dt="2024-03-25T08:13:20.513" v="936" actId="20577"/>
+        <pc:sldMkLst>
+          <pc:docMk/>
+          <pc:sldMk cId="2863176854" sldId="424"/>
+        </pc:sldMkLst>
+        <pc:spChg chg="mod">
+          <ac:chgData name="Francescatto, Margherita" userId="8dce2127-3ed7-41e9-a69d-639dab6d0671" providerId="ADAL" clId="{0DCF6245-685A-46A6-B416-3AF283E3E215}" dt="2024-03-25T08:13:20.513" v="936" actId="20577"/>
+          <ac:spMkLst>
+            <pc:docMk/>
+            <pc:sldMk cId="2863176854" sldId="424"/>
+            <ac:spMk id="11" creationId="{825EE2FD-D59C-4D6F-93E9-415E324D68C1}"/>
+          </ac:spMkLst>
+        </pc:spChg>
+      </pc:sldChg>
+      <pc:sldChg chg="modSp mod">
+        <pc:chgData name="Francescatto, Margherita" userId="8dce2127-3ed7-41e9-a69d-639dab6d0671" providerId="ADAL" clId="{0DCF6245-685A-46A6-B416-3AF283E3E215}" dt="2024-03-25T08:57:38.216" v="1148" actId="20577"/>
+        <pc:sldMkLst>
+          <pc:docMk/>
+          <pc:sldMk cId="2822721206" sldId="425"/>
+        </pc:sldMkLst>
+        <pc:spChg chg="mod">
+          <ac:chgData name="Francescatto, Margherita" userId="8dce2127-3ed7-41e9-a69d-639dab6d0671" providerId="ADAL" clId="{0DCF6245-685A-46A6-B416-3AF283E3E215}" dt="2024-03-25T08:57:38.216" v="1148" actId="20577"/>
+          <ac:spMkLst>
+            <pc:docMk/>
+            <pc:sldMk cId="2822721206" sldId="425"/>
+            <ac:spMk id="11" creationId="{825EE2FD-D59C-4D6F-93E9-415E324D68C1}"/>
+          </ac:spMkLst>
+        </pc:spChg>
+      </pc:sldChg>
+      <pc:sldChg chg="modSp mod setBg">
+        <pc:chgData name="Francescatto, Margherita" userId="8dce2127-3ed7-41e9-a69d-639dab6d0671" providerId="ADAL" clId="{0DCF6245-685A-46A6-B416-3AF283E3E215}" dt="2024-03-25T09:26:28.781" v="1239" actId="20577"/>
+        <pc:sldMkLst>
+          <pc:docMk/>
+          <pc:sldMk cId="3675913702" sldId="426"/>
+        </pc:sldMkLst>
+        <pc:spChg chg="mod">
+          <ac:chgData name="Francescatto, Margherita" userId="8dce2127-3ed7-41e9-a69d-639dab6d0671" providerId="ADAL" clId="{0DCF6245-685A-46A6-B416-3AF283E3E215}" dt="2024-03-25T09:26:28.781" v="1239" actId="20577"/>
+          <ac:spMkLst>
+            <pc:docMk/>
+            <pc:sldMk cId="3675913702" sldId="426"/>
+            <ac:spMk id="11" creationId="{825EE2FD-D59C-4D6F-93E9-415E324D68C1}"/>
+          </ac:spMkLst>
+        </pc:spChg>
+      </pc:sldChg>
+      <pc:sldChg chg="modSp mod setBg">
+        <pc:chgData name="Francescatto, Margherita" userId="8dce2127-3ed7-41e9-a69d-639dab6d0671" providerId="ADAL" clId="{0DCF6245-685A-46A6-B416-3AF283E3E215}" dt="2024-03-25T09:34:01.609" v="1280" actId="20577"/>
+        <pc:sldMkLst>
+          <pc:docMk/>
+          <pc:sldMk cId="4290168742" sldId="427"/>
+        </pc:sldMkLst>
+        <pc:spChg chg="mod">
+          <ac:chgData name="Francescatto, Margherita" userId="8dce2127-3ed7-41e9-a69d-639dab6d0671" providerId="ADAL" clId="{0DCF6245-685A-46A6-B416-3AF283E3E215}" dt="2024-03-25T09:34:01.609" v="1280" actId="20577"/>
+          <ac:spMkLst>
+            <pc:docMk/>
+            <pc:sldMk cId="4290168742" sldId="427"/>
+            <ac:spMk id="8" creationId="{8F913F96-0DE0-449E-A6B9-C426B24C592B}"/>
+          </ac:spMkLst>
+        </pc:spChg>
+      </pc:sldChg>
+      <pc:sldChg chg="modSp mod">
+        <pc:chgData name="Francescatto, Margherita" userId="8dce2127-3ed7-41e9-a69d-639dab6d0671" providerId="ADAL" clId="{0DCF6245-685A-46A6-B416-3AF283E3E215}" dt="2024-03-25T07:40:49.321" v="704" actId="20577"/>
+        <pc:sldMkLst>
+          <pc:docMk/>
+          <pc:sldMk cId="2064303052" sldId="429"/>
+        </pc:sldMkLst>
+        <pc:spChg chg="mod">
+          <ac:chgData name="Francescatto, Margherita" userId="8dce2127-3ed7-41e9-a69d-639dab6d0671" providerId="ADAL" clId="{0DCF6245-685A-46A6-B416-3AF283E3E215}" dt="2024-03-25T07:40:49.321" v="704" actId="20577"/>
+          <ac:spMkLst>
+            <pc:docMk/>
+            <pc:sldMk cId="2064303052" sldId="429"/>
+            <ac:spMk id="9" creationId="{4E42B628-8463-4E75-A5A1-234D3CBE4E01}"/>
+          </ac:spMkLst>
+        </pc:spChg>
+      </pc:sldChg>
+      <pc:sldChg chg="delSp modSp mod setBg">
+        <pc:chgData name="Francescatto, Margherita" userId="8dce2127-3ed7-41e9-a69d-639dab6d0671" providerId="ADAL" clId="{0DCF6245-685A-46A6-B416-3AF283E3E215}" dt="2024-03-25T08:59:03.281" v="1158" actId="20577"/>
+        <pc:sldMkLst>
+          <pc:docMk/>
+          <pc:sldMk cId="3773682852" sldId="430"/>
+        </pc:sldMkLst>
+        <pc:spChg chg="mod">
+          <ac:chgData name="Francescatto, Margherita" userId="8dce2127-3ed7-41e9-a69d-639dab6d0671" providerId="ADAL" clId="{0DCF6245-685A-46A6-B416-3AF283E3E215}" dt="2024-03-25T08:59:03.281" v="1158" actId="20577"/>
+          <ac:spMkLst>
+            <pc:docMk/>
+            <pc:sldMk cId="3773682852" sldId="430"/>
+            <ac:spMk id="2" creationId="{F7DA9A4F-1DFD-49DB-8569-F5AB18BD6161}"/>
+          </ac:spMkLst>
+        </pc:spChg>
+        <pc:spChg chg="del">
+          <ac:chgData name="Francescatto, Margherita" userId="8dce2127-3ed7-41e9-a69d-639dab6d0671" providerId="ADAL" clId="{0DCF6245-685A-46A6-B416-3AF283E3E215}" dt="2024-03-22T12:58:44.995" v="302" actId="478"/>
+          <ac:spMkLst>
+            <pc:docMk/>
+            <pc:sldMk cId="3773682852" sldId="430"/>
+            <ac:spMk id="8" creationId="{4FE232C3-38A4-4476-9CD6-45D51931E2C5}"/>
+          </ac:spMkLst>
+        </pc:spChg>
+        <pc:spChg chg="mod">
+          <ac:chgData name="Francescatto, Margherita" userId="8dce2127-3ed7-41e9-a69d-639dab6d0671" providerId="ADAL" clId="{0DCF6245-685A-46A6-B416-3AF283E3E215}" dt="2024-03-25T07:41:11.188" v="710" actId="20577"/>
+          <ac:spMkLst>
+            <pc:docMk/>
+            <pc:sldMk cId="3773682852" sldId="430"/>
+            <ac:spMk id="9" creationId="{4E42B628-8463-4E75-A5A1-234D3CBE4E01}"/>
+          </ac:spMkLst>
+        </pc:spChg>
+      </pc:sldChg>
+      <pc:sldChg chg="modSp mod setBg">
+        <pc:chgData name="Francescatto, Margherita" userId="8dce2127-3ed7-41e9-a69d-639dab6d0671" providerId="ADAL" clId="{0DCF6245-685A-46A6-B416-3AF283E3E215}" dt="2024-03-25T08:58:58.418" v="1156" actId="20577"/>
+        <pc:sldMkLst>
+          <pc:docMk/>
+          <pc:sldMk cId="3674916990" sldId="431"/>
+        </pc:sldMkLst>
+        <pc:spChg chg="mod">
+          <ac:chgData name="Francescatto, Margherita" userId="8dce2127-3ed7-41e9-a69d-639dab6d0671" providerId="ADAL" clId="{0DCF6245-685A-46A6-B416-3AF283E3E215}" dt="2024-03-25T08:58:58.418" v="1156" actId="20577"/>
+          <ac:spMkLst>
+            <pc:docMk/>
+            <pc:sldMk cId="3674916990" sldId="431"/>
+            <ac:spMk id="2" creationId="{F7DA9A4F-1DFD-49DB-8569-F5AB18BD6161}"/>
+          </ac:spMkLst>
+        </pc:spChg>
+        <pc:spChg chg="mod">
+          <ac:chgData name="Francescatto, Margherita" userId="8dce2127-3ed7-41e9-a69d-639dab6d0671" providerId="ADAL" clId="{0DCF6245-685A-46A6-B416-3AF283E3E215}" dt="2024-03-25T07:42:16.425" v="713" actId="20577"/>
+          <ac:spMkLst>
+            <pc:docMk/>
+            <pc:sldMk cId="3674916990" sldId="431"/>
+            <ac:spMk id="10" creationId="{87EF281D-74A7-4071-A974-B8F17ADCBDF7}"/>
+          </ac:spMkLst>
+        </pc:spChg>
+      </pc:sldChg>
+      <pc:sldChg chg="modSp mod">
+        <pc:chgData name="Francescatto, Margherita" userId="8dce2127-3ed7-41e9-a69d-639dab6d0671" providerId="ADAL" clId="{0DCF6245-685A-46A6-B416-3AF283E3E215}" dt="2024-03-25T07:42:50.730" v="714" actId="113"/>
+        <pc:sldMkLst>
+          <pc:docMk/>
+          <pc:sldMk cId="139242176" sldId="432"/>
+        </pc:sldMkLst>
+        <pc:spChg chg="mod">
+          <ac:chgData name="Francescatto, Margherita" userId="8dce2127-3ed7-41e9-a69d-639dab6d0671" providerId="ADAL" clId="{0DCF6245-685A-46A6-B416-3AF283E3E215}" dt="2024-03-25T07:42:50.730" v="714" actId="113"/>
+          <ac:spMkLst>
+            <pc:docMk/>
+            <pc:sldMk cId="139242176" sldId="432"/>
+            <ac:spMk id="7" creationId="{1BF91155-53EB-479C-86F9-C4F36BCB8400}"/>
+          </ac:spMkLst>
+        </pc:spChg>
+        <pc:picChg chg="mod">
+          <ac:chgData name="Francescatto, Margherita" userId="8dce2127-3ed7-41e9-a69d-639dab6d0671" providerId="ADAL" clId="{0DCF6245-685A-46A6-B416-3AF283E3E215}" dt="2024-03-22T13:00:55.427" v="361" actId="1036"/>
+          <ac:picMkLst>
+            <pc:docMk/>
+            <pc:sldMk cId="139242176" sldId="432"/>
+            <ac:picMk id="5" creationId="{F5001BCD-2966-4F0F-A388-B68AFFF5E348}"/>
+          </ac:picMkLst>
+        </pc:picChg>
+      </pc:sldChg>
+      <pc:sldChg chg="modSp mod setBg">
+        <pc:chgData name="Francescatto, Margherita" userId="8dce2127-3ed7-41e9-a69d-639dab6d0671" providerId="ADAL" clId="{0DCF6245-685A-46A6-B416-3AF283E3E215}" dt="2024-03-25T08:59:08.544" v="1160" actId="20577"/>
+        <pc:sldMkLst>
+          <pc:docMk/>
+          <pc:sldMk cId="3512269219" sldId="433"/>
+        </pc:sldMkLst>
+        <pc:spChg chg="mod">
+          <ac:chgData name="Francescatto, Margherita" userId="8dce2127-3ed7-41e9-a69d-639dab6d0671" providerId="ADAL" clId="{0DCF6245-685A-46A6-B416-3AF283E3E215}" dt="2024-03-25T08:59:08.544" v="1160" actId="20577"/>
+          <ac:spMkLst>
+            <pc:docMk/>
+            <pc:sldMk cId="3512269219" sldId="433"/>
+            <ac:spMk id="2" creationId="{F7DA9A4F-1DFD-49DB-8569-F5AB18BD6161}"/>
+          </ac:spMkLst>
+        </pc:spChg>
+        <pc:spChg chg="mod">
+          <ac:chgData name="Francescatto, Margherita" userId="8dce2127-3ed7-41e9-a69d-639dab6d0671" providerId="ADAL" clId="{0DCF6245-685A-46A6-B416-3AF283E3E215}" dt="2024-03-25T07:43:20.603" v="723" actId="20577"/>
+          <ac:spMkLst>
+            <pc:docMk/>
+            <pc:sldMk cId="3512269219" sldId="433"/>
+            <ac:spMk id="7" creationId="{1BF91155-53EB-479C-86F9-C4F36BCB8400}"/>
+          </ac:spMkLst>
+        </pc:spChg>
+      </pc:sldChg>
+      <pc:sldChg chg="modSp mod setBg">
+        <pc:chgData name="Francescatto, Margherita" userId="8dce2127-3ed7-41e9-a69d-639dab6d0671" providerId="ADAL" clId="{0DCF6245-685A-46A6-B416-3AF283E3E215}" dt="2024-03-25T09:27:06.641" v="1243" actId="20577"/>
+        <pc:sldMkLst>
+          <pc:docMk/>
+          <pc:sldMk cId="433163882" sldId="434"/>
+        </pc:sldMkLst>
+        <pc:spChg chg="mod">
+          <ac:chgData name="Francescatto, Margherita" userId="8dce2127-3ed7-41e9-a69d-639dab6d0671" providerId="ADAL" clId="{0DCF6245-685A-46A6-B416-3AF283E3E215}" dt="2024-03-25T09:27:06.641" v="1243" actId="20577"/>
+          <ac:spMkLst>
+            <pc:docMk/>
+            <pc:sldMk cId="433163882" sldId="434"/>
+            <ac:spMk id="2" creationId="{F7DA9A4F-1DFD-49DB-8569-F5AB18BD6161}"/>
+          </ac:spMkLst>
+        </pc:spChg>
+        <pc:spChg chg="mod">
+          <ac:chgData name="Francescatto, Margherita" userId="8dce2127-3ed7-41e9-a69d-639dab6d0671" providerId="ADAL" clId="{0DCF6245-685A-46A6-B416-3AF283E3E215}" dt="2024-03-25T07:43:47.974" v="724" actId="948"/>
+          <ac:spMkLst>
+            <pc:docMk/>
+            <pc:sldMk cId="433163882" sldId="434"/>
+            <ac:spMk id="8" creationId="{FE14E548-262F-470A-8730-68D0A4DEF43C}"/>
+          </ac:spMkLst>
+        </pc:spChg>
+      </pc:sldChg>
+      <pc:sldChg chg="modSp mod">
+        <pc:chgData name="Francescatto, Margherita" userId="8dce2127-3ed7-41e9-a69d-639dab6d0671" providerId="ADAL" clId="{0DCF6245-685A-46A6-B416-3AF283E3E215}" dt="2024-03-25T09:23:45.977" v="1210" actId="20577"/>
+        <pc:sldMkLst>
+          <pc:docMk/>
+          <pc:sldMk cId="805139721" sldId="435"/>
+        </pc:sldMkLst>
+        <pc:spChg chg="mod">
+          <ac:chgData name="Francescatto, Margherita" userId="8dce2127-3ed7-41e9-a69d-639dab6d0671" providerId="ADAL" clId="{0DCF6245-685A-46A6-B416-3AF283E3E215}" dt="2024-03-25T09:23:45.977" v="1210" actId="20577"/>
+          <ac:spMkLst>
+            <pc:docMk/>
+            <pc:sldMk cId="805139721" sldId="435"/>
+            <ac:spMk id="7" creationId="{C9E501F4-AD05-4BC7-8343-36A53D5E6CEF}"/>
+          </ac:spMkLst>
+        </pc:spChg>
+        <pc:spChg chg="mod">
+          <ac:chgData name="Francescatto, Margherita" userId="8dce2127-3ed7-41e9-a69d-639dab6d0671" providerId="ADAL" clId="{0DCF6245-685A-46A6-B416-3AF283E3E215}" dt="2024-03-25T07:45:13.581" v="781" actId="113"/>
+          <ac:spMkLst>
+            <pc:docMk/>
+            <pc:sldMk cId="805139721" sldId="435"/>
+            <ac:spMk id="9" creationId="{82630EEF-054B-4DDF-9431-278614739A39}"/>
+          </ac:spMkLst>
+        </pc:spChg>
+        <pc:spChg chg="mod">
+          <ac:chgData name="Francescatto, Margherita" userId="8dce2127-3ed7-41e9-a69d-639dab6d0671" providerId="ADAL" clId="{0DCF6245-685A-46A6-B416-3AF283E3E215}" dt="2024-03-25T07:45:33.041" v="798" actId="113"/>
+          <ac:spMkLst>
+            <pc:docMk/>
+            <pc:sldMk cId="805139721" sldId="435"/>
+            <ac:spMk id="12" creationId="{262D519B-AF9D-442A-80BD-0B3F50B165F5}"/>
+          </ac:spMkLst>
+        </pc:spChg>
+        <pc:picChg chg="mod">
+          <ac:chgData name="Francescatto, Margherita" userId="8dce2127-3ed7-41e9-a69d-639dab6d0671" providerId="ADAL" clId="{0DCF6245-685A-46A6-B416-3AF283E3E215}" dt="2024-03-25T07:44:26.128" v="751" actId="1035"/>
+          <ac:picMkLst>
+            <pc:docMk/>
+            <pc:sldMk cId="805139721" sldId="435"/>
+            <ac:picMk id="5" creationId="{A542DE20-E612-4CF9-AB12-2B3E568B0000}"/>
+          </ac:picMkLst>
+        </pc:picChg>
+      </pc:sldChg>
+      <pc:sldChg chg="modSp mod setBg">
+        <pc:chgData name="Francescatto, Margherita" userId="8dce2127-3ed7-41e9-a69d-639dab6d0671" providerId="ADAL" clId="{0DCF6245-685A-46A6-B416-3AF283E3E215}" dt="2024-03-25T09:27:12.684" v="1245" actId="20577"/>
+        <pc:sldMkLst>
+          <pc:docMk/>
+          <pc:sldMk cId="4226423776" sldId="437"/>
+        </pc:sldMkLst>
+        <pc:spChg chg="mod">
+          <ac:chgData name="Francescatto, Margherita" userId="8dce2127-3ed7-41e9-a69d-639dab6d0671" providerId="ADAL" clId="{0DCF6245-685A-46A6-B416-3AF283E3E215}" dt="2024-03-25T09:27:12.684" v="1245" actId="20577"/>
+          <ac:spMkLst>
+            <pc:docMk/>
+            <pc:sldMk cId="4226423776" sldId="437"/>
+            <ac:spMk id="2" creationId="{F7DA9A4F-1DFD-49DB-8569-F5AB18BD6161}"/>
+          </ac:spMkLst>
+        </pc:spChg>
+        <pc:spChg chg="mod">
+          <ac:chgData name="Francescatto, Margherita" userId="8dce2127-3ed7-41e9-a69d-639dab6d0671" providerId="ADAL" clId="{0DCF6245-685A-46A6-B416-3AF283E3E215}" dt="2024-03-25T07:47:08.891" v="834" actId="20577"/>
+          <ac:spMkLst>
+            <pc:docMk/>
+            <pc:sldMk cId="4226423776" sldId="437"/>
+            <ac:spMk id="7" creationId="{C9E501F4-AD05-4BC7-8343-36A53D5E6CEF}"/>
+          </ac:spMkLst>
+        </pc:spChg>
+      </pc:sldChg>
+      <pc:sldChg chg="modSp mod setBg">
+        <pc:chgData name="Francescatto, Margherita" userId="8dce2127-3ed7-41e9-a69d-639dab6d0671" providerId="ADAL" clId="{0DCF6245-685A-46A6-B416-3AF283E3E215}" dt="2024-03-25T09:27:16.821" v="1247" actId="20577"/>
+        <pc:sldMkLst>
+          <pc:docMk/>
+          <pc:sldMk cId="396861457" sldId="438"/>
+        </pc:sldMkLst>
+        <pc:spChg chg="mod">
+          <ac:chgData name="Francescatto, Margherita" userId="8dce2127-3ed7-41e9-a69d-639dab6d0671" providerId="ADAL" clId="{0DCF6245-685A-46A6-B416-3AF283E3E215}" dt="2024-03-25T09:27:16.821" v="1247" actId="20577"/>
+          <ac:spMkLst>
+            <pc:docMk/>
+            <pc:sldMk cId="396861457" sldId="438"/>
+            <ac:spMk id="2" creationId="{F7DA9A4F-1DFD-49DB-8569-F5AB18BD6161}"/>
+          </ac:spMkLst>
+        </pc:spChg>
+      </pc:sldChg>
+      <pc:sldChg chg="modSp mod">
+        <pc:chgData name="Francescatto, Margherita" userId="8dce2127-3ed7-41e9-a69d-639dab6d0671" providerId="ADAL" clId="{0DCF6245-685A-46A6-B416-3AF283E3E215}" dt="2024-03-25T07:49:46.880" v="915" actId="113"/>
+        <pc:sldMkLst>
+          <pc:docMk/>
+          <pc:sldMk cId="3872188134" sldId="439"/>
+        </pc:sldMkLst>
+        <pc:spChg chg="mod">
+          <ac:chgData name="Francescatto, Margherita" userId="8dce2127-3ed7-41e9-a69d-639dab6d0671" providerId="ADAL" clId="{0DCF6245-685A-46A6-B416-3AF283E3E215}" dt="2024-03-25T07:49:46.880" v="915" actId="113"/>
+          <ac:spMkLst>
+            <pc:docMk/>
+            <pc:sldMk cId="3872188134" sldId="439"/>
+            <ac:spMk id="6" creationId="{28280EFD-605B-4843-8D20-931E34B69861}"/>
+          </ac:spMkLst>
+        </pc:spChg>
+      </pc:sldChg>
+      <pc:sldChg chg="modSp mod setBg">
+        <pc:chgData name="Francescatto, Margherita" userId="8dce2127-3ed7-41e9-a69d-639dab6d0671" providerId="ADAL" clId="{0DCF6245-685A-46A6-B416-3AF283E3E215}" dt="2024-03-25T09:27:28.380" v="1251" actId="20577"/>
+        <pc:sldMkLst>
+          <pc:docMk/>
+          <pc:sldMk cId="1469587677" sldId="440"/>
+        </pc:sldMkLst>
+        <pc:spChg chg="mod">
+          <ac:chgData name="Francescatto, Margherita" userId="8dce2127-3ed7-41e9-a69d-639dab6d0671" providerId="ADAL" clId="{0DCF6245-685A-46A6-B416-3AF283E3E215}" dt="2024-03-25T09:27:28.380" v="1251" actId="20577"/>
+          <ac:spMkLst>
+            <pc:docMk/>
+            <pc:sldMk cId="1469587677" sldId="440"/>
+            <ac:spMk id="2" creationId="{44E4D7EA-B512-4529-A811-E20DD74F7C79}"/>
+          </ac:spMkLst>
+        </pc:spChg>
+      </pc:sldChg>
+    </pc:docChg>
+  </pc:docChgLst>
+  <pc:docChgLst>
+    <pc:chgData name="McKinney, David" userId="8b945cb3-78ce-42d7-adc5-b07bab32cd5b" providerId="ADAL" clId="{9EB86574-343D-42EA-B9EC-CCCDCC46014A}"/>
+    <pc:docChg chg="addSld delSld modSld">
+      <pc:chgData name="McKinney, David" userId="8b945cb3-78ce-42d7-adc5-b07bab32cd5b" providerId="ADAL" clId="{9EB86574-343D-42EA-B9EC-CCCDCC46014A}" dt="2020-02-21T17:29:46.879" v="1" actId="2696"/>
+      <pc:docMkLst>
+        <pc:docMk/>
+      </pc:docMkLst>
+    </pc:docChg>
+  </pc:docChgLst>
+  <pc:docChgLst>
+    <pc:chgData name="McKinney, David" userId="S::kqkh779@astrazeneca.net::8b945cb3-78ce-42d7-adc5-b07bab32cd5b" providerId="AD" clId="Web-{458AD232-5E99-4B9F-84B9-A2E5BA4533E2}"/>
+    <pc:docChg chg="addSld">
+      <pc:chgData name="McKinney, David" userId="S::kqkh779@astrazeneca.net::8b945cb3-78ce-42d7-adc5-b07bab32cd5b" providerId="AD" clId="Web-{458AD232-5E99-4B9F-84B9-A2E5BA4533E2}" dt="2020-03-19T10:10:07.659" v="0"/>
+      <pc:docMkLst>
+        <pc:docMk/>
+      </pc:docMkLst>
+      <pc:sldChg chg="add replId">
+        <pc:chgData name="McKinney, David" userId="S::kqkh779@astrazeneca.net::8b945cb3-78ce-42d7-adc5-b07bab32cd5b" providerId="AD" clId="Web-{458AD232-5E99-4B9F-84B9-A2E5BA4533E2}" dt="2020-03-19T10:10:07.659" v="0"/>
+        <pc:sldMkLst>
+          <pc:docMk/>
+          <pc:sldMk cId="2207696395" sldId="408"/>
+        </pc:sldMkLst>
       </pc:sldChg>
     </pc:docChg>
   </pc:docChgLst>
@@ -1304,41 +1818,17 @@
     </pc:docChg>
   </pc:docChgLst>
   <pc:docChgLst>
-    <pc:chgData name="McKinney, David" userId="S::kqkh779@astrazeneca.net::8b945cb3-78ce-42d7-adc5-b07bab32cd5b" providerId="AD" clId="Web-{943D79A7-4F12-443F-BB18-E65E88C7EB45}"/>
+    <pc:chgData name="McKinney, David" userId="S::kqkh779@astrazeneca.net::8b945cb3-78ce-42d7-adc5-b07bab32cd5b" providerId="AD" clId="Web-{F4A4F6B3-72F9-4822-8E52-DDD660AB8108}"/>
     <pc:docChg chg="modSld">
-      <pc:chgData name="McKinney, David" userId="S::kqkh779@astrazeneca.net::8b945cb3-78ce-42d7-adc5-b07bab32cd5b" providerId="AD" clId="Web-{943D79A7-4F12-443F-BB18-E65E88C7EB45}" dt="2020-02-21T16:31:49.586" v="1"/>
+      <pc:chgData name="McKinney, David" userId="S::kqkh779@astrazeneca.net::8b945cb3-78ce-42d7-adc5-b07bab32cd5b" providerId="AD" clId="Web-{F4A4F6B3-72F9-4822-8E52-DDD660AB8108}" dt="2020-03-19T12:29:58.308" v="1"/>
       <pc:docMkLst>
         <pc:docMk/>
       </pc:docMkLst>
-      <pc:sldChg chg="addSp delSp modSp">
-        <pc:chgData name="McKinney, David" userId="S::kqkh779@astrazeneca.net::8b945cb3-78ce-42d7-adc5-b07bab32cd5b" providerId="AD" clId="Web-{943D79A7-4F12-443F-BB18-E65E88C7EB45}" dt="2020-02-21T16:31:49.586" v="1"/>
+      <pc:sldChg chg="addAnim modAnim">
+        <pc:chgData name="McKinney, David" userId="S::kqkh779@astrazeneca.net::8b945cb3-78ce-42d7-adc5-b07bab32cd5b" providerId="AD" clId="Web-{F4A4F6B3-72F9-4822-8E52-DDD660AB8108}" dt="2020-03-19T12:29:58.308" v="1"/>
         <pc:sldMkLst>
           <pc:docMk/>
-          <pc:sldMk cId="1416647349" sldId="404"/>
-        </pc:sldMkLst>
-        <pc:picChg chg="add del mod">
-          <ac:chgData name="McKinney, David" userId="S::kqkh779@astrazeneca.net::8b945cb3-78ce-42d7-adc5-b07bab32cd5b" providerId="AD" clId="Web-{943D79A7-4F12-443F-BB18-E65E88C7EB45}" dt="2020-02-21T16:31:49.586" v="1"/>
-          <ac:picMkLst>
-            <pc:docMk/>
-            <pc:sldMk cId="1416647349" sldId="404"/>
-            <ac:picMk id="7" creationId="{ADC23ABF-9E9F-406C-BF99-C7710FFD1480}"/>
-          </ac:picMkLst>
-        </pc:picChg>
-      </pc:sldChg>
-    </pc:docChg>
-  </pc:docChgLst>
-  <pc:docChgLst>
-    <pc:chgData name="Whittaker, Ryan" userId="S::kbqc931@astrazeneca.net::873b3a98-b8cc-426f-9da0-8dcfa40dc643" providerId="AD" clId="Web-{2632E73B-7AF1-4FEF-AC15-A6FF3B03BA1F}"/>
-    <pc:docChg chg="sldOrd">
-      <pc:chgData name="Whittaker, Ryan" userId="S::kbqc931@astrazeneca.net::873b3a98-b8cc-426f-9da0-8dcfa40dc643" providerId="AD" clId="Web-{2632E73B-7AF1-4FEF-AC15-A6FF3B03BA1F}" dt="2020-02-10T15:28:36.667" v="1"/>
-      <pc:docMkLst>
-        <pc:docMk/>
-      </pc:docMkLst>
-      <pc:sldChg chg="ord">
-        <pc:chgData name="Whittaker, Ryan" userId="S::kbqc931@astrazeneca.net::873b3a98-b8cc-426f-9da0-8dcfa40dc643" providerId="AD" clId="Web-{2632E73B-7AF1-4FEF-AC15-A6FF3B03BA1F}" dt="2020-02-10T15:28:36.667" v="1"/>
-        <pc:sldMkLst>
-          <pc:docMk/>
-          <pc:sldMk cId="2729279789" sldId="402"/>
+          <pc:sldMk cId="1416124321" sldId="400"/>
         </pc:sldMkLst>
       </pc:sldChg>
     </pc:docChg>
@@ -1429,7 +1919,7 @@
             <a:fld id="{3BBED7E8-0829-F34C-B479-A757805E6C1B}" type="datetimeFigureOut">
               <a:rPr lang="en-US" smtClean="0"/>
               <a:pPr/>
-              <a:t>4/12/2021</a:t>
+              <a:t>3/25/2024</a:t>
             </a:fld>
             <a:endParaRPr lang="en-US"/>
           </a:p>
@@ -1597,7 +2087,7 @@
             <a:fld id="{6C7E4F11-7667-5045-A00B-01970EA44BB5}" type="datetimeFigureOut">
               <a:rPr lang="en-US" smtClean="0"/>
               <a:pPr/>
-              <a:t>4/12/2021</a:t>
+              <a:t>3/25/2024</a:t>
             </a:fld>
             <a:endParaRPr lang="en-US"/>
           </a:p>
@@ -27457,6 +27947,17 @@
 <file path=ppt/slides/slide10.xml><?xml version="1.0" encoding="utf-8"?>
 <p:sld xmlns:a="http://schemas.openxmlformats.org/drawingml/2006/main" xmlns:r="http://schemas.openxmlformats.org/officeDocument/2006/relationships" xmlns:p="http://schemas.openxmlformats.org/presentationml/2006/main" showMasterSp="0">
   <p:cSld>
+    <p:bg>
+      <p:bgPr>
+        <a:solidFill>
+          <a:schemeClr val="accent3">
+            <a:lumMod val="40000"/>
+            <a:lumOff val="60000"/>
+          </a:schemeClr>
+        </a:solidFill>
+        <a:effectLst/>
+      </p:bgPr>
+    </p:bg>
     <p:spTree>
       <p:nvGrpSpPr>
         <p:cNvPr id="1" name=""/>
@@ -27494,7 +27995,7 @@
           <a:p>
             <a:r>
               <a:rPr lang="en-GB" dirty="0"/>
-              <a:t>Extracting List Elements Puzzles</a:t>
+              <a:t>Extracting List Elements - Puzzles</a:t>
             </a:r>
           </a:p>
         </p:txBody>
@@ -27529,57 +28030,8 @@
           </a:p>
         </p:txBody>
       </p:sp>
-      <p:sp>
-        <p:nvSpPr>
-          <p:cNvPr id="8" name="TextBox 7">
-            <a:extLst>
-              <a:ext uri="{FF2B5EF4-FFF2-40B4-BE49-F238E27FC236}">
-                <a16:creationId xmlns:a16="http://schemas.microsoft.com/office/drawing/2014/main" id="{4FE232C3-38A4-4476-9CD6-45D51931E2C5}"/>
-              </a:ext>
-            </a:extLst>
-          </p:cNvPr>
-          <p:cNvSpPr txBox="1"/>
-          <p:nvPr/>
-        </p:nvSpPr>
-        <p:spPr>
-          <a:xfrm>
-            <a:off x="5760385" y="48746"/>
-            <a:ext cx="584948" cy="1323439"/>
-          </a:xfrm>
-          <a:prstGeom prst="rect">
-            <a:avLst/>
-          </a:prstGeom>
-          <a:noFill/>
-        </p:spPr>
-        <p:txBody>
-          <a:bodyPr rot="0" spcFirstLastPara="0" vertOverflow="overflow" horzOverflow="overflow" vert="horz" wrap="square" lIns="91440" tIns="45720" rIns="91440" bIns="45720" numCol="1" spcCol="0" rtlCol="0" fromWordArt="0" anchor="t" anchorCtr="0" forceAA="0" compatLnSpc="1">
-            <a:prstTxWarp prst="textNoShape">
-              <a:avLst/>
-            </a:prstTxWarp>
-            <a:spAutoFit/>
-          </a:bodyPr>
-          <a:lstStyle/>
-          <a:p>
-            <a:pPr algn="l"/>
-            <a:r>
-              <a:rPr lang="en-GB" sz="8000" dirty="0">
-                <a:solidFill>
-                  <a:schemeClr val="bg1"/>
-                </a:solidFill>
-              </a:rPr>
-              <a:t>!</a:t>
-            </a:r>
-            <a:endParaRPr lang="en-US" sz="8000" dirty="0">
-              <a:solidFill>
-                <a:schemeClr val="bg1"/>
-              </a:solidFill>
-              <a:cs typeface="Arial"/>
-            </a:endParaRPr>
-          </a:p>
-        </p:txBody>
-      </p:sp>
-      <mc:AlternateContent xmlns:mc="http://schemas.openxmlformats.org/markup-compatibility/2006" xmlns:a14="http://schemas.microsoft.com/office/drawing/2010/main">
-        <mc:Choice Requires="a14">
+      <mc:AlternateContent xmlns:mc="http://schemas.openxmlformats.org/markup-compatibility/2006">
+        <mc:Choice xmlns:a14="http://schemas.microsoft.com/office/drawing/2010/main" Requires="a14">
           <p:sp>
             <p:nvSpPr>
               <p:cNvPr id="9" name="Text Placeholder 2">
@@ -27815,11 +28267,18 @@
                   </m:oMath>
                 </a14:m>
                 <a:r>
+                  <a:rPr lang="en-GB" sz="2000" baseline="30000" dirty="0">
+                    <a:latin typeface="Arial"/>
+                    <a:cs typeface="Arial"/>
+                  </a:rPr>
+                  <a:t>th</a:t>
+                </a:r>
+                <a:r>
                   <a:rPr lang="en-GB" sz="2000" dirty="0">
                     <a:latin typeface="Arial"/>
                     <a:cs typeface="Arial"/>
                   </a:rPr>
-                  <a:t>th element of a list (for some general value of </a:t>
+                  <a:t> element of a list (for some general value of </a:t>
                 </a:r>
                 <a14:m>
                   <m:oMath xmlns:m="http://schemas.openxmlformats.org/officeDocument/2006/math">
@@ -27906,7 +28365,7 @@
             </p:txBody>
           </p:sp>
         </mc:Choice>
-        <mc:Fallback xmlns="">
+        <mc:Fallback>
           <p:sp>
             <p:nvSpPr>
               <p:cNvPr id="9" name="Text Placeholder 2">
@@ -27932,7 +28391,7 @@
               <a:blipFill>
                 <a:blip r:embed="rId2"/>
                 <a:stretch>
-                  <a:fillRect l="-639" t="-785" r="-710"/>
+                  <a:fillRect l="-639" t="-785" r="-994"/>
                 </a:stretch>
               </a:blipFill>
             </p:spPr>
@@ -27941,7 +28400,7 @@
               <a:lstStyle/>
               <a:p>
                 <a:r>
-                  <a:rPr lang="en-GB">
+                  <a:rPr lang="en-SE">
                     <a:noFill/>
                   </a:rPr>
                   <a:t> </a:t>
@@ -27996,6 +28455,17 @@
 <file path=ppt/slides/slide11.xml><?xml version="1.0" encoding="utf-8"?>
 <p:sld xmlns:a="http://schemas.openxmlformats.org/drawingml/2006/main" xmlns:r="http://schemas.openxmlformats.org/officeDocument/2006/relationships" xmlns:p="http://schemas.openxmlformats.org/presentationml/2006/main" showMasterSp="0">
   <p:cSld>
+    <p:bg>
+      <p:bgPr>
+        <a:solidFill>
+          <a:schemeClr val="accent3">
+            <a:lumMod val="40000"/>
+            <a:lumOff val="60000"/>
+          </a:schemeClr>
+        </a:solidFill>
+        <a:effectLst/>
+      </p:bgPr>
+    </p:bg>
     <p:spTree>
       <p:nvGrpSpPr>
         <p:cNvPr id="1" name=""/>
@@ -28033,7 +28503,7 @@
           <a:p>
             <a:r>
               <a:rPr lang="en-GB" dirty="0"/>
-              <a:t>Extracting List Elements Puzzles Solutions</a:t>
+              <a:t>Extracting List Elements - Puzzles Solutions</a:t>
             </a:r>
           </a:p>
         </p:txBody>
@@ -28127,8 +28597,8 @@
           </a:prstGeom>
         </p:spPr>
       </p:pic>
-      <mc:AlternateContent xmlns:mc="http://schemas.openxmlformats.org/markup-compatibility/2006" xmlns:a14="http://schemas.microsoft.com/office/drawing/2010/main">
-        <mc:Choice Requires="a14">
+      <mc:AlternateContent xmlns:mc="http://schemas.openxmlformats.org/markup-compatibility/2006">
+        <mc:Choice xmlns:a14="http://schemas.microsoft.com/office/drawing/2010/main" Requires="a14">
           <p:sp>
             <p:nvSpPr>
               <p:cNvPr id="10" name="Text Placeholder 2">
@@ -28293,6 +28763,9 @@
               </a:lstStyle>
               <a:p>
                 <a:pPr marL="342900" indent="-342900">
+                  <a:spcBef>
+                    <a:spcPts val="1200"/>
+                  </a:spcBef>
                   <a:buFont typeface="Arial"/>
                   <a:buChar char="•"/>
                 </a:pPr>
@@ -28315,11 +28788,18 @@
                   </m:oMath>
                 </a14:m>
                 <a:r>
+                  <a:rPr lang="en-GB" sz="2000" baseline="30000" dirty="0">
+                    <a:latin typeface="Arial"/>
+                    <a:cs typeface="Arial"/>
+                  </a:rPr>
+                  <a:t>th</a:t>
+                </a:r>
+                <a:r>
                   <a:rPr lang="en-GB" sz="2000" dirty="0">
                     <a:latin typeface="Arial"/>
                     <a:cs typeface="Arial"/>
                   </a:rPr>
-                  <a:t>th element of a list by using index </a:t>
+                  <a:t> element of a list by using index </a:t>
                 </a:r>
                 <a14:m>
                   <m:oMath xmlns:m="http://schemas.openxmlformats.org/officeDocument/2006/math">
@@ -28346,6 +28826,9 @@
               </a:p>
               <a:p>
                 <a:pPr marL="342900" indent="-342900">
+                  <a:spcBef>
+                    <a:spcPts val="1200"/>
+                  </a:spcBef>
                   <a:buFont typeface="Arial"/>
                   <a:buChar char="•"/>
                 </a:pPr>
@@ -28354,13 +28837,13 @@
                     <a:latin typeface="Arial"/>
                     <a:cs typeface="Arial"/>
                   </a:rPr>
-                  <a:t>The compensates for the offset introduced by using index zero for the first element</a:t>
+                  <a:t>The -1 compensates for the offset introduced by using index zero for the first element</a:t>
                 </a:r>
               </a:p>
             </p:txBody>
           </p:sp>
         </mc:Choice>
-        <mc:Fallback xmlns="">
+        <mc:Fallback>
           <p:sp>
             <p:nvSpPr>
               <p:cNvPr id="10" name="Text Placeholder 2">
@@ -28395,7 +28878,7 @@
               <a:lstStyle/>
               <a:p>
                 <a:r>
-                  <a:rPr lang="en-GB">
+                  <a:rPr lang="en-SE">
                     <a:noFill/>
                   </a:rPr>
                   <a:t> </a:t>
@@ -28686,6 +29169,9 @@
           </a:lstStyle>
           <a:p>
             <a:pPr marL="342900" indent="-342900">
+              <a:spcBef>
+                <a:spcPts val="1200"/>
+              </a:spcBef>
               <a:buFont typeface="Arial"/>
               <a:buChar char="•"/>
             </a:pPr>
@@ -28694,20 +29180,7 @@
                 <a:latin typeface="Arial"/>
                 <a:cs typeface="Arial"/>
               </a:rPr>
-              <a:t>At times we may wish to extract a sub-list from within a larger list</a:t>
-            </a:r>
-          </a:p>
-          <a:p>
-            <a:pPr marL="342900" indent="-342900">
-              <a:buFont typeface="Arial"/>
-              <a:buChar char="•"/>
-            </a:pPr>
-            <a:r>
-              <a:rPr lang="en-GB" sz="2000" dirty="0">
-                <a:latin typeface="Arial"/>
-                <a:cs typeface="Arial"/>
-              </a:rPr>
-              <a:t>For example we may want a new list containing only the 2</a:t>
+              <a:t>At times we may wish to extract a sub-list from within a larger list, e.g. to get a new list containing only the 2</a:t>
             </a:r>
             <a:r>
               <a:rPr lang="en-GB" sz="2000" baseline="30000" dirty="0">
@@ -28721,7 +29194,21 @@
                 <a:latin typeface="Arial"/>
                 <a:cs typeface="Arial"/>
               </a:rPr>
-              <a:t>–4</a:t>
+              <a:t>, 3</a:t>
+            </a:r>
+            <a:r>
+              <a:rPr lang="en-GB" sz="2000" baseline="30000" dirty="0">
+                <a:latin typeface="Arial"/>
+                <a:cs typeface="Arial"/>
+              </a:rPr>
+              <a:t>rd</a:t>
+            </a:r>
+            <a:r>
+              <a:rPr lang="en-GB" sz="2000" dirty="0">
+                <a:latin typeface="Arial"/>
+                <a:cs typeface="Arial"/>
+              </a:rPr>
+              <a:t> and 4</a:t>
             </a:r>
             <a:r>
               <a:rPr lang="en-GB" sz="2000" baseline="30000" dirty="0">
@@ -28740,6 +29227,9 @@
           </a:p>
           <a:p>
             <a:pPr marL="342900" indent="-342900">
+              <a:spcBef>
+                <a:spcPts val="1200"/>
+              </a:spcBef>
               <a:buFont typeface="Arial"/>
               <a:buChar char="•"/>
             </a:pPr>
@@ -28748,11 +29238,28 @@
                 <a:latin typeface="Arial"/>
                 <a:cs typeface="Arial"/>
               </a:rPr>
-              <a:t>We can achieve this by using a slice instead of an index</a:t>
+              <a:t>We can achieve this by using a </a:t>
+            </a:r>
+            <a:r>
+              <a:rPr lang="en-GB" sz="2000" b="1" dirty="0">
+                <a:latin typeface="Arial"/>
+                <a:cs typeface="Arial"/>
+              </a:rPr>
+              <a:t>slice</a:t>
+            </a:r>
+            <a:r>
+              <a:rPr lang="en-GB" sz="2000" dirty="0">
+                <a:latin typeface="Arial"/>
+                <a:cs typeface="Arial"/>
+              </a:rPr>
+              <a:t> instead of an index</a:t>
             </a:r>
           </a:p>
           <a:p>
             <a:pPr marL="342900" indent="-342900">
+              <a:spcBef>
+                <a:spcPts val="1200"/>
+              </a:spcBef>
               <a:buFont typeface="Arial"/>
               <a:buChar char="•"/>
             </a:pPr>
@@ -28766,6 +29273,9 @@
           </a:p>
           <a:p>
             <a:pPr marL="342900" indent="-342900">
+              <a:spcBef>
+                <a:spcPts val="1200"/>
+              </a:spcBef>
               <a:buFont typeface="Arial"/>
               <a:buChar char="•"/>
             </a:pPr>
@@ -28807,7 +29317,7 @@
         </p:blipFill>
         <p:spPr>
           <a:xfrm>
-            <a:off x="1076325" y="2906544"/>
+            <a:off x="1076325" y="3341442"/>
             <a:ext cx="6991350" cy="1524000"/>
           </a:xfrm>
           <a:prstGeom prst="rect">
@@ -28831,6 +29341,17 @@
 <file path=ppt/slides/slide13.xml><?xml version="1.0" encoding="utf-8"?>
 <p:sld xmlns:a="http://schemas.openxmlformats.org/drawingml/2006/main" xmlns:r="http://schemas.openxmlformats.org/officeDocument/2006/relationships" xmlns:p="http://schemas.openxmlformats.org/presentationml/2006/main" showMasterSp="0">
   <p:cSld>
+    <p:bg>
+      <p:bgPr>
+        <a:solidFill>
+          <a:schemeClr val="accent3">
+            <a:lumMod val="40000"/>
+            <a:lumOff val="60000"/>
+          </a:schemeClr>
+        </a:solidFill>
+        <a:effectLst/>
+      </p:bgPr>
+    </p:bg>
     <p:spTree>
       <p:nvGrpSpPr>
         <p:cNvPr id="1" name=""/>
@@ -28868,7 +29389,7 @@
           <a:p>
             <a:r>
               <a:rPr lang="en-GB" dirty="0"/>
-              <a:t>Slicing Lists Puzzles</a:t>
+              <a:t>Slicing Lists - Puzzles</a:t>
             </a:r>
           </a:p>
         </p:txBody>
@@ -29108,16 +29629,13 @@
             </a:r>
           </a:p>
           <a:p>
-            <a:pPr marL="1257300" lvl="2" indent="-342900">
-              <a:buFont typeface="Arial"/>
-              <a:buChar char="•"/>
-            </a:pPr>
+            <a:pPr lvl="2"/>
             <a:r>
               <a:rPr lang="en-GB" sz="1050" i="1" dirty="0">
                 <a:latin typeface="Arial"/>
                 <a:cs typeface="Arial"/>
               </a:rPr>
-              <a:t>Doc, Grumpy, Happy, Sleepy, Bashful, Sneezy, Dopey</a:t>
+              <a:t>(hint: Doc, Grumpy, Happy, Sleepy, Bashful, Sneezy, Dopey)</a:t>
             </a:r>
           </a:p>
           <a:p>
@@ -29270,6 +29788,17 @@
 <file path=ppt/slides/slide14.xml><?xml version="1.0" encoding="utf-8"?>
 <p:sld xmlns:a="http://schemas.openxmlformats.org/drawingml/2006/main" xmlns:r="http://schemas.openxmlformats.org/officeDocument/2006/relationships" xmlns:p="http://schemas.openxmlformats.org/presentationml/2006/main" showMasterSp="0">
   <p:cSld>
+    <p:bg>
+      <p:bgPr>
+        <a:solidFill>
+          <a:schemeClr val="accent3">
+            <a:lumMod val="40000"/>
+            <a:lumOff val="60000"/>
+          </a:schemeClr>
+        </a:solidFill>
+        <a:effectLst/>
+      </p:bgPr>
+    </p:bg>
     <p:spTree>
       <p:nvGrpSpPr>
         <p:cNvPr id="1" name=""/>
@@ -29307,7 +29836,7 @@
           <a:p>
             <a:r>
               <a:rPr lang="en-GB" dirty="0"/>
-              <a:t>Slicing Lists Puzzles Solutions</a:t>
+              <a:t>Slicing Lists - Puzzles Solutions</a:t>
             </a:r>
           </a:p>
         </p:txBody>
@@ -29565,6 +30094,9 @@
           </a:lstStyle>
           <a:p>
             <a:pPr marL="342900" indent="-342900">
+              <a:spcBef>
+                <a:spcPts val="1200"/>
+              </a:spcBef>
               <a:buFont typeface="Arial"/>
               <a:buChar char="•"/>
             </a:pPr>
@@ -29578,6 +30110,9 @@
           </a:p>
           <a:p>
             <a:pPr marL="342900" indent="-342900">
+              <a:spcBef>
+                <a:spcPts val="1200"/>
+              </a:spcBef>
               <a:buFont typeface="Arial"/>
               <a:buChar char="•"/>
             </a:pPr>
@@ -29651,8 +30186,8 @@
         </p:nvSpPr>
         <p:spPr>
           <a:xfrm>
-            <a:off x="5147663" y="2109738"/>
-            <a:ext cx="2928304" cy="2462457"/>
+            <a:off x="5147662" y="2109738"/>
+            <a:ext cx="3428909" cy="2462457"/>
           </a:xfrm>
           <a:prstGeom prst="rect">
             <a:avLst/>
@@ -29803,7 +30338,7 @@
               <a:buChar char="•"/>
             </a:pPr>
             <a:r>
-              <a:rPr lang="en-GB" sz="1400" dirty="0">
+              <a:rPr lang="en-GB" sz="1600" dirty="0">
                 <a:latin typeface="Arial"/>
                 <a:cs typeface="Arial"/>
               </a:rPr>
@@ -29866,11 +30401,18 @@
               <a:buChar char="•"/>
             </a:pPr>
             <a:r>
-              <a:rPr lang="en-GB" sz="1400" dirty="0">
+              <a:rPr lang="en-GB" sz="1600" dirty="0">
                 <a:latin typeface="Arial"/>
                 <a:cs typeface="Arial"/>
               </a:rPr>
-              <a:t>Delete by value</a:t>
+              <a:t>Delete by value using </a:t>
+            </a:r>
+            <a:r>
+              <a:rPr lang="en-GB" sz="1600" b="1" dirty="0">
+                <a:latin typeface="Arial"/>
+                <a:cs typeface="Arial"/>
+              </a:rPr>
+              <a:t>remove</a:t>
             </a:r>
           </a:p>
         </p:txBody>
@@ -30134,7 +30676,14 @@
                 <a:latin typeface="Arial"/>
                 <a:cs typeface="Arial"/>
               </a:rPr>
-              <a:t>Once we have created a list, Python allows us to manipulate it; adding, removing, and altering elements</a:t>
+              <a:t>Once a list is created, Python allows us to manipulate it by adding, removing, and altering elements using </a:t>
+            </a:r>
+            <a:r>
+              <a:rPr lang="en-GB" sz="2000" b="1" dirty="0">
+                <a:latin typeface="Arial"/>
+                <a:cs typeface="Arial"/>
+              </a:rPr>
+              <a:t>list methods</a:t>
             </a:r>
           </a:p>
         </p:txBody>
@@ -30161,7 +30710,7 @@
         </p:blipFill>
         <p:spPr>
           <a:xfrm>
-            <a:off x="2884017" y="1563823"/>
+            <a:off x="2884017" y="1514963"/>
             <a:ext cx="3375966" cy="480959"/>
           </a:xfrm>
           <a:prstGeom prst="rect">
@@ -30337,11 +30886,18 @@
               <a:buChar char="•"/>
             </a:pPr>
             <a:r>
-              <a:rPr lang="en-GB" sz="1400" dirty="0">
+              <a:rPr lang="en-GB" sz="1600" dirty="0">
                 <a:latin typeface="Arial"/>
                 <a:cs typeface="Arial"/>
               </a:rPr>
-              <a:t>Add to the end of the list:</a:t>
+              <a:t>Add to the end of the list using </a:t>
+            </a:r>
+            <a:r>
+              <a:rPr lang="en-GB" sz="1600" b="1" dirty="0">
+                <a:latin typeface="Arial"/>
+                <a:cs typeface="Arial"/>
+              </a:rPr>
+              <a:t>append</a:t>
             </a:r>
           </a:p>
           <a:p>
@@ -30400,11 +30956,18 @@
               <a:buChar char="•"/>
             </a:pPr>
             <a:r>
-              <a:rPr lang="en-GB" sz="1400" dirty="0">
+              <a:rPr lang="en-GB" sz="1600" dirty="0">
                 <a:latin typeface="Arial"/>
                 <a:cs typeface="Arial"/>
               </a:rPr>
-              <a:t>Delete by position/index</a:t>
+              <a:t>Delete by position/index using </a:t>
+            </a:r>
+            <a:r>
+              <a:rPr lang="en-GB" sz="1600" b="1" dirty="0">
+                <a:latin typeface="Arial"/>
+                <a:cs typeface="Arial"/>
+              </a:rPr>
+              <a:t>del</a:t>
             </a:r>
           </a:p>
         </p:txBody>
@@ -30925,6 +31488,17 @@
 <file path=ppt/slides/slide17.xml><?xml version="1.0" encoding="utf-8"?>
 <p:sld xmlns:a="http://schemas.openxmlformats.org/drawingml/2006/main" xmlns:r="http://schemas.openxmlformats.org/officeDocument/2006/relationships" xmlns:p="http://schemas.openxmlformats.org/presentationml/2006/main" showMasterSp="0">
   <p:cSld>
+    <p:bg>
+      <p:bgPr>
+        <a:solidFill>
+          <a:schemeClr val="accent3">
+            <a:lumMod val="40000"/>
+            <a:lumOff val="60000"/>
+          </a:schemeClr>
+        </a:solidFill>
+        <a:effectLst/>
+      </p:bgPr>
+    </p:bg>
     <p:spTree>
       <p:nvGrpSpPr>
         <p:cNvPr id="1" name=""/>
@@ -30962,7 +31536,7 @@
           <a:p>
             <a:r>
               <a:rPr lang="en-GB" dirty="0"/>
-              <a:t>Manipulating Lists Puzzles</a:t>
+              <a:t>Manipulating Lists - Puzzles</a:t>
             </a:r>
           </a:p>
         </p:txBody>
@@ -31190,6 +31764,9 @@
           </a:lstStyle>
           <a:p>
             <a:pPr marL="342900" indent="-342900">
+              <a:spcBef>
+                <a:spcPts val="1200"/>
+              </a:spcBef>
               <a:buFont typeface="Arial"/>
               <a:buChar char="•"/>
             </a:pPr>
@@ -31198,35 +31775,18 @@
                 <a:latin typeface="Arial"/>
                 <a:cs typeface="Arial"/>
               </a:rPr>
-              <a:t>Create a list containing the numbers</a:t>
-            </a:r>
-          </a:p>
-          <a:p>
+              <a:t>Create a list containing the numbers 24, 14, 45, 666, 74, 3, 78</a:t>
+            </a:r>
             <a:endParaRPr lang="en-GB" sz="400" dirty="0">
               <a:latin typeface="Arial"/>
               <a:cs typeface="Arial"/>
             </a:endParaRPr>
           </a:p>
           <a:p>
-            <a:pPr marL="457200" indent="-457200" algn="ctr">
-              <a:buAutoNum type="arabicPlain" startAt="23"/>
-            </a:pPr>
-            <a:r>
-              <a:rPr lang="en-GB" sz="2000" dirty="0">
-                <a:latin typeface="Arial"/>
-                <a:cs typeface="Arial"/>
-              </a:rPr>
-              <a:t>14    45   666    74    3    78</a:t>
-            </a:r>
-          </a:p>
-          <a:p>
-            <a:endParaRPr lang="en-GB" sz="400" dirty="0">
-              <a:latin typeface="Arial"/>
-              <a:cs typeface="Arial"/>
-            </a:endParaRPr>
-          </a:p>
-          <a:p>
             <a:pPr marL="342900" indent="-342900">
+              <a:spcBef>
+                <a:spcPts val="1200"/>
+              </a:spcBef>
               <a:buFont typeface="Arial" panose="020B0604020202020204" pitchFamily="34" charset="0"/>
               <a:buChar char="•"/>
             </a:pPr>
@@ -31240,6 +31800,9 @@
           </a:p>
           <a:p>
             <a:pPr marL="342900" indent="-342900">
+              <a:spcBef>
+                <a:spcPts val="1200"/>
+              </a:spcBef>
               <a:buFont typeface="Arial" panose="020B0604020202020204" pitchFamily="34" charset="0"/>
               <a:buChar char="•"/>
             </a:pPr>
@@ -31281,6 +31844,9 @@
           </a:p>
           <a:p>
             <a:pPr marL="342900" indent="-342900">
+              <a:spcBef>
+                <a:spcPts val="1200"/>
+              </a:spcBef>
               <a:buFont typeface="Arial" panose="020B0604020202020204" pitchFamily="34" charset="0"/>
               <a:buChar char="•"/>
             </a:pPr>
@@ -31294,6 +31860,9 @@
           </a:p>
           <a:p>
             <a:pPr marL="342900" indent="-342900">
+              <a:spcBef>
+                <a:spcPts val="1200"/>
+              </a:spcBef>
               <a:buFont typeface="Arial" panose="020B0604020202020204" pitchFamily="34" charset="0"/>
               <a:buChar char="•"/>
             </a:pPr>
@@ -31307,6 +31876,9 @@
           </a:p>
           <a:p>
             <a:pPr marL="342900" indent="-342900">
+              <a:spcBef>
+                <a:spcPts val="1200"/>
+              </a:spcBef>
               <a:buFont typeface="Arial" panose="020B0604020202020204" pitchFamily="34" charset="0"/>
               <a:buChar char="•"/>
             </a:pPr>
@@ -31380,6 +31952,17 @@
 <file path=ppt/slides/slide18.xml><?xml version="1.0" encoding="utf-8"?>
 <p:sld xmlns:a="http://schemas.openxmlformats.org/drawingml/2006/main" xmlns:r="http://schemas.openxmlformats.org/officeDocument/2006/relationships" xmlns:p="http://schemas.openxmlformats.org/presentationml/2006/main" showMasterSp="0">
   <p:cSld>
+    <p:bg>
+      <p:bgPr>
+        <a:solidFill>
+          <a:schemeClr val="accent3">
+            <a:lumMod val="40000"/>
+            <a:lumOff val="60000"/>
+          </a:schemeClr>
+        </a:solidFill>
+        <a:effectLst/>
+      </p:bgPr>
+    </p:bg>
     <p:spTree>
       <p:nvGrpSpPr>
         <p:cNvPr id="1" name=""/>
@@ -31417,7 +32000,7 @@
           <a:p>
             <a:r>
               <a:rPr lang="en-GB" dirty="0"/>
-              <a:t>Manipulating Lists Puzzles Solutions</a:t>
+              <a:t>Manipulating Lists - Puzzles Solutions</a:t>
             </a:r>
           </a:p>
         </p:txBody>
@@ -31796,11 +32379,18 @@
               <a:buChar char="•"/>
             </a:pPr>
             <a:r>
+              <a:rPr lang="en-GB" sz="2000" b="1" dirty="0">
+                <a:latin typeface="Arial"/>
+                <a:cs typeface="Arial"/>
+              </a:rPr>
+              <a:t>Tuples</a:t>
+            </a:r>
+            <a:r>
               <a:rPr lang="en-GB" sz="2000" dirty="0">
                 <a:latin typeface="Arial"/>
                 <a:cs typeface="Arial"/>
               </a:rPr>
-              <a:t>Tuples are similar to lists but have a few key differences</a:t>
+              <a:t> are similar to lists</a:t>
             </a:r>
           </a:p>
           <a:p>
@@ -31813,7 +32403,14 @@
                 <a:latin typeface="Arial"/>
                 <a:cs typeface="Arial"/>
               </a:rPr>
-              <a:t>We define tuples in the same way as lists except we using parentheses instead of square brackets</a:t>
+              <a:t>We define tuples similarly to how we define lists, but </a:t>
+            </a:r>
+            <a:r>
+              <a:rPr lang="en-GB" sz="2000" b="1" dirty="0">
+                <a:latin typeface="Arial"/>
+                <a:cs typeface="Arial"/>
+              </a:rPr>
+              <a:t>using parentheses instead of square brackets</a:t>
             </a:r>
           </a:p>
           <a:p>
@@ -31909,7 +32506,28 @@
                 <a:latin typeface="Arial"/>
                 <a:cs typeface="Arial"/>
               </a:rPr>
-              <a:t>The main difference is that tuples cannot be manipulated once they are created (i.e. no appending, deleting, or overwriting)</a:t>
+              <a:t>Main difference: </a:t>
+            </a:r>
+            <a:r>
+              <a:rPr lang="en-GB" sz="2000" b="1" dirty="0">
+                <a:latin typeface="Arial"/>
+                <a:cs typeface="Arial"/>
+              </a:rPr>
+              <a:t>tuples cannot be manipulated</a:t>
+            </a:r>
+            <a:r>
+              <a:rPr lang="en-GB" sz="2000" dirty="0">
+                <a:latin typeface="Arial"/>
+                <a:cs typeface="Arial"/>
+              </a:rPr>
+              <a:t> once they are created (i.e. no appending, deleting, or overwriting). They are </a:t>
+            </a:r>
+            <a:r>
+              <a:rPr lang="en-GB" sz="2000" b="1" dirty="0">
+                <a:latin typeface="Arial"/>
+                <a:cs typeface="Arial"/>
+              </a:rPr>
+              <a:t>immutable</a:t>
             </a:r>
           </a:p>
         </p:txBody>
@@ -32259,6 +32877,9 @@
           </a:lstStyle>
           <a:p>
             <a:pPr marL="342900" indent="-342900">
+              <a:spcBef>
+                <a:spcPts val="1200"/>
+              </a:spcBef>
               <a:buFont typeface="Arial"/>
               <a:buChar char="•"/>
             </a:pPr>
@@ -32267,20 +32888,65 @@
                 <a:latin typeface="Arial"/>
                 <a:cs typeface="Arial"/>
               </a:rPr>
-              <a:t>In the previous session we looked at how we can use control flow in our code to implement logic, alongside While loops to repeat commands</a:t>
-            </a:r>
-          </a:p>
-          <a:p>
-            <a:pPr marL="342900" indent="-342900">
-              <a:buFont typeface="Arial"/>
-              <a:buChar char="•"/>
-            </a:pPr>
+              <a:t>In the previous session we learned how to use </a:t>
+            </a:r>
+            <a:r>
+              <a:rPr lang="en-GB" sz="2000" b="1" dirty="0">
+                <a:latin typeface="Arial"/>
+                <a:cs typeface="Arial"/>
+              </a:rPr>
+              <a:t>if/</a:t>
+            </a:r>
+            <a:r>
+              <a:rPr lang="en-GB" sz="2000" b="1" dirty="0" err="1">
+                <a:latin typeface="Arial"/>
+                <a:cs typeface="Arial"/>
+              </a:rPr>
+              <a:t>elif</a:t>
+            </a:r>
+            <a:r>
+              <a:rPr lang="en-GB" sz="2000" b="1" dirty="0">
+                <a:latin typeface="Arial"/>
+                <a:cs typeface="Arial"/>
+              </a:rPr>
+              <a:t>/else statements</a:t>
+            </a:r>
             <a:r>
               <a:rPr lang="en-GB" sz="2000" dirty="0">
                 <a:latin typeface="Arial"/>
                 <a:cs typeface="Arial"/>
               </a:rPr>
-              <a:t>It is worth making explicit that it is okay to nest if/</a:t>
+              <a:t> to implement logic and </a:t>
+            </a:r>
+            <a:r>
+              <a:rPr lang="en-GB" sz="2000" b="1" dirty="0">
+                <a:latin typeface="Arial"/>
+                <a:cs typeface="Arial"/>
+              </a:rPr>
+              <a:t>while loops</a:t>
+            </a:r>
+            <a:r>
+              <a:rPr lang="en-GB" sz="2000" dirty="0">
+                <a:latin typeface="Arial"/>
+                <a:cs typeface="Arial"/>
+              </a:rPr>
+              <a:t> to repeat commands</a:t>
+            </a:r>
+          </a:p>
+          <a:p>
+            <a:pPr marL="342900" indent="-342900">
+              <a:spcBef>
+                <a:spcPts val="1200"/>
+              </a:spcBef>
+              <a:buFont typeface="Arial"/>
+              <a:buChar char="•"/>
+            </a:pPr>
+            <a:r>
+              <a:rPr lang="en-GB" sz="2000" dirty="0">
+                <a:latin typeface="Arial"/>
+                <a:cs typeface="Arial"/>
+              </a:rPr>
+              <a:t>It is possible to nest if/</a:t>
             </a:r>
             <a:r>
               <a:rPr lang="en-GB" sz="2000" dirty="0" err="1">
@@ -32294,11 +32960,14 @@
                 <a:latin typeface="Arial"/>
                 <a:cs typeface="Arial"/>
               </a:rPr>
-              <a:t>/else statements and while loops in other control flow/loops</a:t>
+              <a:t>/else statements and while loops</a:t>
             </a:r>
           </a:p>
           <a:p>
             <a:pPr marL="342900" indent="-342900">
+              <a:spcBef>
+                <a:spcPts val="1200"/>
+              </a:spcBef>
               <a:buFont typeface="Arial"/>
               <a:buChar char="•"/>
             </a:pPr>
@@ -32695,6 +33364,17 @@
 <file path=ppt/slides/slide21.xml><?xml version="1.0" encoding="utf-8"?>
 <p:sld xmlns:a="http://schemas.openxmlformats.org/drawingml/2006/main" xmlns:r="http://schemas.openxmlformats.org/officeDocument/2006/relationships" xmlns:p="http://schemas.openxmlformats.org/presentationml/2006/main" showMasterSp="0">
   <p:cSld>
+    <p:bg>
+      <p:bgPr>
+        <a:solidFill>
+          <a:schemeClr val="accent3">
+            <a:lumMod val="40000"/>
+            <a:lumOff val="60000"/>
+          </a:schemeClr>
+        </a:solidFill>
+        <a:effectLst/>
+      </p:bgPr>
+    </p:bg>
     <p:spTree>
       <p:nvGrpSpPr>
         <p:cNvPr id="1" name=""/>
@@ -32735,7 +33415,7 @@
                 <a:latin typeface="Arial"/>
                 <a:cs typeface="Arial"/>
               </a:rPr>
-              <a:t>Tuples Puzzles</a:t>
+              <a:t>Tuples - Puzzles</a:t>
             </a:r>
             <a:endParaRPr lang="en-GB" dirty="0"/>
           </a:p>
@@ -32935,6 +33615,9 @@
           </a:lstStyle>
           <a:p>
             <a:pPr marL="342900" indent="-342900">
+              <a:spcBef>
+                <a:spcPts val="1200"/>
+              </a:spcBef>
               <a:buFont typeface="Arial"/>
               <a:buChar char="•"/>
             </a:pPr>
@@ -32948,6 +33631,9 @@
           </a:p>
           <a:p>
             <a:pPr marL="342900" indent="-342900">
+              <a:spcBef>
+                <a:spcPts val="1200"/>
+              </a:spcBef>
               <a:buFont typeface="Arial"/>
               <a:buChar char="•"/>
             </a:pPr>
@@ -32961,6 +33647,9 @@
           </a:p>
           <a:p>
             <a:pPr marL="342900" indent="-342900">
+              <a:spcBef>
+                <a:spcPts val="1200"/>
+              </a:spcBef>
               <a:buFont typeface="Arial"/>
               <a:buChar char="•"/>
             </a:pPr>
@@ -32974,6 +33663,9 @@
           </a:p>
           <a:p>
             <a:pPr marL="342900" indent="-342900">
+              <a:spcBef>
+                <a:spcPts val="1200"/>
+              </a:spcBef>
               <a:buFont typeface="Arial"/>
               <a:buChar char="•"/>
             </a:pPr>
@@ -32987,6 +33679,9 @@
           </a:p>
           <a:p>
             <a:pPr marL="342900" indent="-342900">
+              <a:spcBef>
+                <a:spcPts val="1200"/>
+              </a:spcBef>
               <a:buFont typeface="Arial"/>
               <a:buChar char="•"/>
             </a:pPr>
@@ -32997,6 +33692,9 @@
           </a:p>
           <a:p>
             <a:pPr marL="342900" indent="-342900">
+              <a:spcBef>
+                <a:spcPts val="1200"/>
+              </a:spcBef>
               <a:buFont typeface="Arial"/>
               <a:buChar char="•"/>
             </a:pPr>
@@ -33012,11 +33710,14 @@
                 <a:latin typeface="Arial"/>
                 <a:cs typeface="Arial"/>
               </a:rPr>
-              <a:t>Create a tuple which contains a number and a list of 3 more numbers</a:t>
+              <a:t>Create a tuple containing a number and a list of 3 numbers</a:t>
             </a:r>
           </a:p>
           <a:p>
             <a:pPr marL="342900" indent="-342900">
+              <a:spcBef>
+                <a:spcPts val="1200"/>
+              </a:spcBef>
               <a:buFont typeface="Arial"/>
               <a:buChar char="•"/>
             </a:pPr>
@@ -33044,6 +33745,9 @@
           </a:p>
           <a:p>
             <a:pPr marL="342900" indent="-342900">
+              <a:spcBef>
+                <a:spcPts val="1200"/>
+              </a:spcBef>
               <a:buFont typeface="Arial"/>
               <a:buChar char="•"/>
             </a:pPr>
@@ -33052,20 +33756,8 @@
                 <a:latin typeface="Arial"/>
                 <a:cs typeface="Arial"/>
               </a:rPr>
-              <a:t>Try to append, remove, and overwrite a value in the nested list. You may be surprised to find that you can do this. You can read more about this </a:t>
-            </a:r>
-            <a:r>
-              <a:rPr lang="en-GB" sz="2000" dirty="0">
-                <a:latin typeface="Arial"/>
-                <a:cs typeface="Arial"/>
-                <a:hlinkClick r:id="rId2"/>
-              </a:rPr>
-              <a:t>here</a:t>
-            </a:r>
-            <a:endParaRPr lang="en-GB" sz="2000" dirty="0">
-              <a:latin typeface="Arial"/>
-              <a:cs typeface="Arial"/>
-            </a:endParaRPr>
+              <a:t>Try to append, remove, and overwrite a value in the nested list. You may be surprised to find that you can do this.</a:t>
+            </a:r>
           </a:p>
         </p:txBody>
       </p:sp>
@@ -33084,7 +33776,7 @@
           <p:nvPr/>
         </p:nvPicPr>
         <p:blipFill rotWithShape="1">
-          <a:blip r:embed="rId3"/>
+          <a:blip r:embed="rId2"/>
           <a:srcRect l="2982" t="3174" r="2869" b="2900"/>
           <a:stretch/>
         </p:blipFill>
@@ -33114,6 +33806,17 @@
 <file path=ppt/slides/slide22.xml><?xml version="1.0" encoding="utf-8"?>
 <p:sld xmlns:a="http://schemas.openxmlformats.org/drawingml/2006/main" xmlns:r="http://schemas.openxmlformats.org/officeDocument/2006/relationships" xmlns:p="http://schemas.openxmlformats.org/presentationml/2006/main" showMasterSp="0">
   <p:cSld>
+    <p:bg>
+      <p:bgPr>
+        <a:solidFill>
+          <a:schemeClr val="accent3">
+            <a:lumMod val="40000"/>
+            <a:lumOff val="60000"/>
+          </a:schemeClr>
+        </a:solidFill>
+        <a:effectLst/>
+      </p:bgPr>
+    </p:bg>
     <p:spTree>
       <p:nvGrpSpPr>
         <p:cNvPr id="1" name=""/>
@@ -33154,14 +33857,7 @@
                 <a:latin typeface="Arial"/>
                 <a:cs typeface="Arial"/>
               </a:rPr>
-              <a:t>Tuples </a:t>
-            </a:r>
-            <a:r>
-              <a:rPr lang="en-GB">
-                <a:latin typeface="Arial"/>
-                <a:cs typeface="Arial"/>
-              </a:rPr>
-              <a:t>Puzzles Solutions</a:t>
+              <a:t>Tuples - Puzzles Solutions</a:t>
             </a:r>
             <a:endParaRPr lang="en-GB" dirty="0"/>
           </a:p>
@@ -33511,6 +34207,9 @@
           <a:lstStyle/>
           <a:p>
             <a:pPr marL="342900" indent="-342900">
+              <a:spcBef>
+                <a:spcPts val="1200"/>
+              </a:spcBef>
               <a:buFont typeface="Arial"/>
               <a:buChar char="•"/>
             </a:pPr>
@@ -33519,11 +34218,14 @@
                 <a:latin typeface="Arial"/>
                 <a:cs typeface="Arial"/>
               </a:rPr>
-              <a:t>Non-numeric Lists</a:t>
+              <a:t>Non-numeric lists</a:t>
             </a:r>
           </a:p>
           <a:p>
             <a:pPr marL="342900" indent="-342900">
+              <a:spcBef>
+                <a:spcPts val="1200"/>
+              </a:spcBef>
               <a:buChar char="•"/>
             </a:pPr>
             <a:r>
@@ -33531,11 +34233,14 @@
                 <a:latin typeface="Arial"/>
                 <a:cs typeface="Arial"/>
               </a:rPr>
-              <a:t>Extracting List Elements</a:t>
+              <a:t>Extracting list elements</a:t>
             </a:r>
           </a:p>
           <a:p>
             <a:pPr marL="342900" indent="-342900">
+              <a:spcBef>
+                <a:spcPts val="1200"/>
+              </a:spcBef>
               <a:buChar char="•"/>
             </a:pPr>
             <a:r>
@@ -33543,11 +34248,14 @@
                 <a:latin typeface="Arial"/>
                 <a:cs typeface="Arial"/>
               </a:rPr>
-              <a:t>Slicing Lists</a:t>
+              <a:t>Slicing lists</a:t>
             </a:r>
           </a:p>
           <a:p>
             <a:pPr marL="342900" indent="-342900">
+              <a:spcBef>
+                <a:spcPts val="1200"/>
+              </a:spcBef>
               <a:buChar char="•"/>
             </a:pPr>
             <a:r>
@@ -33555,11 +34263,14 @@
                 <a:latin typeface="Arial"/>
                 <a:cs typeface="Arial"/>
               </a:rPr>
-              <a:t>Manipulating Lists</a:t>
+              <a:t>Manipulating lists</a:t>
             </a:r>
           </a:p>
           <a:p>
             <a:pPr marL="342900" indent="-342900">
+              <a:spcBef>
+                <a:spcPts val="1200"/>
+              </a:spcBef>
               <a:buChar char="•"/>
             </a:pPr>
             <a:r>
@@ -33857,6 +34568,9 @@
           </a:lstStyle>
           <a:p>
             <a:pPr marL="342900" indent="-342900">
+              <a:spcBef>
+                <a:spcPts val="1200"/>
+              </a:spcBef>
               <a:buFont typeface="Arial"/>
               <a:buChar char="•"/>
             </a:pPr>
@@ -33870,6 +34584,9 @@
           </a:p>
           <a:p>
             <a:pPr marL="342900" indent="-342900">
+              <a:spcBef>
+                <a:spcPts val="1200"/>
+              </a:spcBef>
               <a:buFont typeface="Arial"/>
               <a:buChar char="•"/>
             </a:pPr>
@@ -33878,11 +34595,14 @@
                 <a:latin typeface="Arial"/>
                 <a:cs typeface="Arial"/>
               </a:rPr>
-              <a:t>Python, however, is a flexible language and allows lists to be created with elements from any data type</a:t>
+              <a:t>Python allows lists to be created with elements of any data type</a:t>
             </a:r>
           </a:p>
           <a:p>
             <a:pPr marL="342900" indent="-342900">
+              <a:spcBef>
+                <a:spcPts val="1200"/>
+              </a:spcBef>
               <a:buFont typeface="Arial"/>
               <a:buChar char="•"/>
             </a:pPr>
@@ -33891,11 +34611,14 @@
                 <a:latin typeface="Arial"/>
                 <a:cs typeface="Arial"/>
               </a:rPr>
-              <a:t>We can even mix multiple data types in the same list (though as we’ll later see, we typically prefer tuples for this purpose)</a:t>
+              <a:t>It is possible to mix multiple data types in the same list</a:t>
             </a:r>
           </a:p>
           <a:p>
             <a:pPr marL="342900" indent="-342900">
+              <a:spcBef>
+                <a:spcPts val="1200"/>
+              </a:spcBef>
               <a:buFont typeface="Arial"/>
               <a:buChar char="•"/>
             </a:pPr>
@@ -33904,7 +34627,7 @@
                 <a:latin typeface="Arial"/>
                 <a:cs typeface="Arial"/>
               </a:rPr>
-              <a:t>The common thread is that we define a list using square brackets and comma-separated elements</a:t>
+              <a:t>Independent on the type, we define lists using square brackets and comma-separated elements</a:t>
             </a:r>
           </a:p>
         </p:txBody>
@@ -34224,6 +34947,9 @@
           </a:lstStyle>
           <a:p>
             <a:pPr marL="342900" indent="-342900">
+              <a:spcBef>
+                <a:spcPts val="1200"/>
+              </a:spcBef>
               <a:buFont typeface="Arial"/>
               <a:buChar char="•"/>
             </a:pPr>
@@ -34232,11 +34958,14 @@
                 <a:latin typeface="Arial"/>
                 <a:cs typeface="Arial"/>
               </a:rPr>
-              <a:t>Lists offer a simple way to store multiple pieces of information using a single name</a:t>
+              <a:t>Lists offer a way to store multiple elements using a single name</a:t>
             </a:r>
           </a:p>
           <a:p>
             <a:pPr marL="342900" indent="-342900">
+              <a:spcBef>
+                <a:spcPts val="1200"/>
+              </a:spcBef>
               <a:buFont typeface="Arial"/>
               <a:buChar char="•"/>
             </a:pPr>
@@ -34245,11 +34974,21 @@
                 <a:latin typeface="Arial"/>
                 <a:cs typeface="Arial"/>
               </a:rPr>
-              <a:t>The most important characteristic of a list is that it stores its elements in a specific order</a:t>
+              <a:t>The most important feature of a list is that it </a:t>
+            </a:r>
+            <a:r>
+              <a:rPr lang="en-GB" sz="2000" b="1" dirty="0">
+                <a:latin typeface="Arial"/>
+                <a:cs typeface="Arial"/>
+              </a:rPr>
+              <a:t>stores its elements in a specific order</a:t>
             </a:r>
           </a:p>
           <a:p>
             <a:pPr marL="342900" indent="-342900">
+              <a:spcBef>
+                <a:spcPts val="1200"/>
+              </a:spcBef>
               <a:buFont typeface="Arial"/>
               <a:buChar char="•"/>
             </a:pPr>
@@ -34258,11 +34997,14 @@
                 <a:latin typeface="Arial"/>
                 <a:cs typeface="Arial"/>
               </a:rPr>
-              <a:t>Therefore, lists are only useful for storing data that has a natural ordering or when we don’t care about the ordering</a:t>
+              <a:t>Lists are particularly useful for storing data that has a natural ordering or when we don’t care about the ordering</a:t>
             </a:r>
           </a:p>
           <a:p>
             <a:pPr marL="342900" indent="-342900">
+              <a:spcBef>
+                <a:spcPts val="1200"/>
+              </a:spcBef>
               <a:buFont typeface="Arial"/>
               <a:buChar char="•"/>
             </a:pPr>
@@ -34271,20 +35013,51 @@
                 <a:latin typeface="Arial"/>
                 <a:cs typeface="Arial"/>
               </a:rPr>
-              <a:t>For example, rankings of competitors in a running race could be stored as a list (where the first element is the winner, the second being the next runner up, etc.) </a:t>
-            </a:r>
-          </a:p>
-          <a:p>
-            <a:pPr marL="342900" indent="-342900">
-              <a:buFont typeface="Arial"/>
-              <a:buChar char="•"/>
-            </a:pPr>
+              <a:t>Example: ranking of finishers of a running race can be naturally stored as a list: 1</a:t>
+            </a:r>
+            <a:r>
+              <a:rPr lang="en-GB" sz="2000" baseline="30000" dirty="0">
+                <a:latin typeface="Arial"/>
+                <a:cs typeface="Arial"/>
+              </a:rPr>
+              <a:t>st</a:t>
+            </a:r>
             <a:r>
               <a:rPr lang="en-GB" sz="2000" dirty="0">
                 <a:latin typeface="Arial"/>
                 <a:cs typeface="Arial"/>
               </a:rPr>
-              <a:t>It would be difficult, however, to store the populations of cities in a list since there is no natural method for ordering cities</a:t>
+              <a:t> element is the winner, 2</a:t>
+            </a:r>
+            <a:r>
+              <a:rPr lang="en-GB" sz="2000" baseline="30000" dirty="0">
+                <a:latin typeface="Arial"/>
+                <a:cs typeface="Arial"/>
+              </a:rPr>
+              <a:t>nd</a:t>
+            </a:r>
+            <a:r>
+              <a:rPr lang="en-GB" sz="2000" dirty="0">
+                <a:latin typeface="Arial"/>
+                <a:cs typeface="Arial"/>
+              </a:rPr>
+              <a:t> the next runner up, etc. </a:t>
+            </a:r>
+          </a:p>
+          <a:p>
+            <a:pPr marL="342900" indent="-342900">
+              <a:spcBef>
+                <a:spcPts val="1200"/>
+              </a:spcBef>
+              <a:buFont typeface="Arial"/>
+              <a:buChar char="•"/>
+            </a:pPr>
+            <a:r>
+              <a:rPr lang="en-GB" sz="2000" dirty="0">
+                <a:latin typeface="Arial"/>
+                <a:cs typeface="Arial"/>
+              </a:rPr>
+              <a:t>However, storing e.g. the populations of some cities in a list doesn’t work since there is no natural method for ordering cities</a:t>
             </a:r>
           </a:p>
         </p:txBody>
@@ -34305,6 +35078,17 @@
 <file path=ppt/slides/slide6.xml><?xml version="1.0" encoding="utf-8"?>
 <p:sld xmlns:a="http://schemas.openxmlformats.org/drawingml/2006/main" xmlns:r="http://schemas.openxmlformats.org/officeDocument/2006/relationships" xmlns:p="http://schemas.openxmlformats.org/presentationml/2006/main" showMasterSp="0">
   <p:cSld>
+    <p:bg>
+      <p:bgPr>
+        <a:solidFill>
+          <a:schemeClr val="accent3">
+            <a:lumMod val="40000"/>
+            <a:lumOff val="60000"/>
+          </a:schemeClr>
+        </a:solidFill>
+        <a:effectLst/>
+      </p:bgPr>
+    </p:bg>
     <p:spTree>
       <p:nvGrpSpPr>
         <p:cNvPr id="1" name=""/>
@@ -34574,6 +35358,9 @@
           </a:lstStyle>
           <a:p>
             <a:pPr marL="342900" indent="-342900">
+              <a:spcBef>
+                <a:spcPts val="1200"/>
+              </a:spcBef>
               <a:buFont typeface="Arial"/>
               <a:buChar char="•"/>
             </a:pPr>
@@ -34596,24 +35383,28 @@
                 <a:latin typeface="Arial"/>
                 <a:cs typeface="Arial"/>
               </a:rPr>
-              <a:t>` containing the names of the original star wars trilogy (in order of release) </a:t>
-            </a:r>
-          </a:p>
-          <a:p>
-            <a:pPr marL="1714500" lvl="3" indent="-342900">
-              <a:buFont typeface="Arial"/>
-              <a:buChar char="•"/>
+              <a:t>` containing the names of the original Star Wars Trilogy (in order of release) </a:t>
+            </a:r>
+          </a:p>
+          <a:p>
+            <a:pPr lvl="1">
+              <a:spcBef>
+                <a:spcPts val="1200"/>
+              </a:spcBef>
             </a:pPr>
             <a:r>
               <a:rPr lang="en-GB" sz="1050" i="1" dirty="0">
                 <a:latin typeface="Arial"/>
                 <a:cs typeface="Arial"/>
               </a:rPr>
-              <a:t>A New Hope, The Empire Strikes Back, Return of the Jedi</a:t>
+              <a:t>(A New Hope, The Empire Strikes Back, Return of the Jedi)</a:t>
             </a:r>
           </a:p>
           <a:p>
             <a:pPr marL="342900" indent="-342900">
+              <a:spcBef>
+                <a:spcPts val="1200"/>
+              </a:spcBef>
               <a:buFont typeface="Arial"/>
               <a:buChar char="•"/>
             </a:pPr>
@@ -34622,27 +35413,14 @@
                 <a:latin typeface="Arial"/>
                 <a:cs typeface="Arial"/>
               </a:rPr>
-              <a:t>Create a list with two elements, each of which should be another list containing two numbers</a:t>
+              <a:t>Create a list with two elements, each of which is another list containing two numbers</a:t>
             </a:r>
           </a:p>
           <a:p>
             <a:pPr marL="342900" indent="-342900">
-              <a:buFont typeface="Arial"/>
-              <a:buChar char="•"/>
-            </a:pPr>
-            <a:endParaRPr lang="en-GB" sz="2000" dirty="0">
-              <a:latin typeface="Arial"/>
-              <a:cs typeface="Arial"/>
-            </a:endParaRPr>
-          </a:p>
-          <a:p>
-            <a:endParaRPr lang="en-GB" sz="2000" dirty="0">
-              <a:latin typeface="Arial"/>
-              <a:cs typeface="Arial"/>
-            </a:endParaRPr>
-          </a:p>
-          <a:p>
-            <a:pPr marL="342900" indent="-342900">
+              <a:spcBef>
+                <a:spcPts val="1200"/>
+              </a:spcBef>
               <a:buFont typeface="Arial"/>
               <a:buChar char="•"/>
             </a:pPr>
@@ -34663,6 +35441,9 @@
           </a:p>
           <a:p>
             <a:pPr marL="800100" lvl="1" indent="-342900">
+              <a:spcBef>
+                <a:spcPts val="1200"/>
+              </a:spcBef>
               <a:buFont typeface="Arial"/>
               <a:buChar char="•"/>
             </a:pPr>
@@ -34676,6 +35457,9 @@
           </a:p>
           <a:p>
             <a:pPr marL="800100" lvl="1" indent="-342900">
+              <a:spcBef>
+                <a:spcPts val="0"/>
+              </a:spcBef>
               <a:buFont typeface="Arial"/>
               <a:buChar char="•"/>
             </a:pPr>
@@ -34689,6 +35473,9 @@
           </a:p>
           <a:p>
             <a:pPr marL="800100" lvl="1" indent="-342900">
+              <a:spcBef>
+                <a:spcPts val="0"/>
+              </a:spcBef>
               <a:buFont typeface="Arial"/>
               <a:buChar char="•"/>
             </a:pPr>
@@ -34718,6 +35505,17 @@
 <file path=ppt/slides/slide7.xml><?xml version="1.0" encoding="utf-8"?>
 <p:sld xmlns:a="http://schemas.openxmlformats.org/drawingml/2006/main" xmlns:r="http://schemas.openxmlformats.org/officeDocument/2006/relationships" xmlns:p="http://schemas.openxmlformats.org/presentationml/2006/main" showMasterSp="0">
   <p:cSld>
+    <p:bg>
+      <p:bgPr>
+        <a:solidFill>
+          <a:schemeClr val="accent3">
+            <a:lumMod val="40000"/>
+            <a:lumOff val="60000"/>
+          </a:schemeClr>
+        </a:solidFill>
+        <a:effectLst/>
+      </p:bgPr>
+    </p:bg>
     <p:spTree>
       <p:nvGrpSpPr>
         <p:cNvPr id="1" name=""/>
@@ -35047,6 +35845,9 @@
           </a:lstStyle>
           <a:p>
             <a:pPr marL="342900" indent="-342900">
+              <a:spcBef>
+                <a:spcPts val="1200"/>
+              </a:spcBef>
               <a:buFont typeface="Arial"/>
               <a:buChar char="•"/>
             </a:pPr>
@@ -35055,11 +35856,14 @@
                 <a:latin typeface="Arial"/>
                 <a:cs typeface="Arial"/>
               </a:rPr>
-              <a:t>Don’t be put off by the layout of these list definitions</a:t>
+              <a:t>Notice the layout of these list definitions</a:t>
             </a:r>
           </a:p>
           <a:p>
             <a:pPr marL="342900" indent="-342900">
+              <a:spcBef>
+                <a:spcPts val="1200"/>
+              </a:spcBef>
               <a:buFont typeface="Arial"/>
               <a:buChar char="•"/>
             </a:pPr>
@@ -35087,15 +35891,39 @@
           </a:p>
           <a:p>
             <a:pPr marL="342900" indent="-342900">
+              <a:spcBef>
+                <a:spcPts val="1200"/>
+              </a:spcBef>
               <a:buFont typeface="Arial"/>
               <a:buChar char="•"/>
             </a:pPr>
+            <a:r>
+              <a:rPr lang="en-GB" sz="2000">
+                <a:latin typeface="Arial"/>
+                <a:cs typeface="Arial"/>
+              </a:rPr>
+              <a:t>Formatting </a:t>
+            </a:r>
             <a:r>
               <a:rPr lang="en-GB" sz="2000" dirty="0">
                 <a:latin typeface="Arial"/>
                 <a:cs typeface="Arial"/>
               </a:rPr>
-              <a:t>We simply format complex lists like this to make it easier for humans to see what they contain</a:t>
+              <a:t>complex lists like </a:t>
+            </a:r>
+            <a:r>
+              <a:rPr lang="en-GB" sz="2000">
+                <a:latin typeface="Arial"/>
+                <a:cs typeface="Arial"/>
+              </a:rPr>
+              <a:t>this makes </a:t>
+            </a:r>
+            <a:r>
+              <a:rPr lang="en-GB" sz="2000" dirty="0">
+                <a:latin typeface="Arial"/>
+                <a:cs typeface="Arial"/>
+              </a:rPr>
+              <a:t>it easier for humans to see what they contain</a:t>
             </a:r>
           </a:p>
         </p:txBody>
@@ -35401,6 +36229,9 @@
           </a:lstStyle>
           <a:p>
             <a:pPr marL="342900" indent="-342900">
+              <a:spcBef>
+                <a:spcPts val="1200"/>
+              </a:spcBef>
               <a:buFont typeface="Arial"/>
               <a:buChar char="•"/>
             </a:pPr>
@@ -35409,11 +36240,35 @@
                 <a:latin typeface="Arial"/>
                 <a:cs typeface="Arial"/>
               </a:rPr>
-              <a:t>Lists are composed of multiple elements (sometimes called items)</a:t>
+              <a:t>Lists are composed of multiple </a:t>
+            </a:r>
+            <a:r>
+              <a:rPr lang="en-GB" sz="2000" i="1" dirty="0">
+                <a:latin typeface="Arial"/>
+                <a:cs typeface="Arial"/>
+              </a:rPr>
+              <a:t>elements</a:t>
+            </a:r>
+            <a:r>
+              <a:rPr lang="en-GB" sz="2000" dirty="0">
+                <a:latin typeface="Arial"/>
+                <a:cs typeface="Arial"/>
+              </a:rPr>
+              <a:t> or </a:t>
+            </a:r>
+            <a:r>
+              <a:rPr lang="en-GB" sz="2000" i="1" dirty="0">
+                <a:latin typeface="Arial"/>
+                <a:cs typeface="Arial"/>
+              </a:rPr>
+              <a:t>items</a:t>
             </a:r>
           </a:p>
           <a:p>
             <a:pPr marL="342900" indent="-342900">
+              <a:spcBef>
+                <a:spcPts val="1200"/>
+              </a:spcBef>
               <a:buFont typeface="Arial"/>
               <a:buChar char="•"/>
             </a:pPr>
@@ -35425,7 +36280,7 @@
               <a:t>Each element has an </a:t>
             </a:r>
             <a:r>
-              <a:rPr lang="en-GB" sz="2000" i="1" dirty="0">
+              <a:rPr lang="en-GB" sz="2000" b="1" dirty="0">
                 <a:latin typeface="Arial"/>
                 <a:cs typeface="Arial"/>
               </a:rPr>
@@ -35436,11 +36291,14 @@
                 <a:latin typeface="Arial"/>
                 <a:cs typeface="Arial"/>
               </a:rPr>
-              <a:t>. Think of this as its address</a:t>
+              <a:t>. You can think of it as an address</a:t>
             </a:r>
           </a:p>
           <a:p>
             <a:pPr marL="342900" indent="-342900">
+              <a:spcBef>
+                <a:spcPts val="1200"/>
+              </a:spcBef>
               <a:buFont typeface="Arial"/>
               <a:buChar char="•"/>
             </a:pPr>
@@ -35449,11 +36307,14 @@
                 <a:latin typeface="Arial"/>
                 <a:cs typeface="Arial"/>
               </a:rPr>
-              <a:t>The first element in the list is given the index (address) zero</a:t>
+              <a:t>The first element in the list has index 0, the second element has index 1, the third has index 2 etc.</a:t>
             </a:r>
           </a:p>
           <a:p>
             <a:pPr marL="342900" indent="-342900">
+              <a:spcBef>
+                <a:spcPts val="1200"/>
+              </a:spcBef>
               <a:buFont typeface="Arial"/>
               <a:buChar char="•"/>
             </a:pPr>
@@ -35462,20 +36323,35 @@
                 <a:latin typeface="Arial"/>
                 <a:cs typeface="Arial"/>
               </a:rPr>
-              <a:t>This then increases for each element so that the second element has index one, and the third, index two</a:t>
-            </a:r>
-          </a:p>
-          <a:p>
-            <a:pPr marL="342900" indent="-342900">
-              <a:buFont typeface="Arial"/>
-              <a:buChar char="•"/>
-            </a:pPr>
+              <a:t>We can access an element of a list named </a:t>
+            </a:r>
+            <a:r>
+              <a:rPr lang="en-GB" sz="2000" dirty="0" err="1">
+                <a:latin typeface="Arial"/>
+                <a:cs typeface="Arial"/>
+              </a:rPr>
+              <a:t>my_list</a:t>
+            </a:r>
             <a:r>
               <a:rPr lang="en-GB" sz="2000" dirty="0">
                 <a:latin typeface="Arial"/>
                 <a:cs typeface="Arial"/>
               </a:rPr>
-              <a:t>We can access an element of a list by following its name with square brackets containing the index of the element we are interested in</a:t>
+              <a:t> with the syntax </a:t>
+            </a:r>
+            <a:r>
+              <a:rPr lang="en-GB" sz="2000" dirty="0" err="1">
+                <a:latin typeface="Arial"/>
+                <a:cs typeface="Arial"/>
+              </a:rPr>
+              <a:t>my_list</a:t>
+            </a:r>
+            <a:r>
+              <a:rPr lang="en-GB" sz="2000" dirty="0">
+                <a:latin typeface="Arial"/>
+                <a:cs typeface="Arial"/>
+              </a:rPr>
+              <a:t>[index]</a:t>
             </a:r>
           </a:p>
         </p:txBody>
@@ -35502,7 +36378,7 @@
         </p:blipFill>
         <p:spPr>
           <a:xfrm>
-            <a:off x="1638300" y="3225173"/>
+            <a:off x="1598080" y="3541904"/>
             <a:ext cx="5867400" cy="1466850"/>
           </a:xfrm>
           <a:prstGeom prst="rect">
@@ -35840,19 +36716,32 @@
           </a:lstStyle>
           <a:p>
             <a:pPr marL="342900" indent="-342900">
+              <a:spcBef>
+                <a:spcPts val="1200"/>
+              </a:spcBef>
               <a:buFont typeface="Arial"/>
               <a:buChar char="•"/>
             </a:pPr>
+            <a:r>
+              <a:rPr lang="en-GB" sz="2000" b="1" dirty="0">
+                <a:latin typeface="Arial"/>
+                <a:cs typeface="Arial"/>
+              </a:rPr>
+              <a:t>Negative indexes</a:t>
+            </a:r>
             <a:r>
               <a:rPr lang="en-GB" sz="2000" dirty="0">
                 <a:latin typeface="Arial"/>
                 <a:cs typeface="Arial"/>
               </a:rPr>
-              <a:t>We can also extract elements of a list using negative indices</a:t>
+              <a:t> can be used as well</a:t>
             </a:r>
           </a:p>
           <a:p>
             <a:pPr marL="342900" indent="-342900">
+              <a:spcBef>
+                <a:spcPts val="1200"/>
+              </a:spcBef>
               <a:buFont typeface="Arial"/>
               <a:buChar char="•"/>
             </a:pPr>
@@ -35861,11 +36750,28 @@
                 <a:latin typeface="Arial"/>
                 <a:cs typeface="Arial"/>
               </a:rPr>
-              <a:t>Whereas positive (non-negative) indices start from the first element in the list, negative indices start from the last</a:t>
+              <a:t>Whereas non-negative indices start from the 1</a:t>
+            </a:r>
+            <a:r>
+              <a:rPr lang="en-GB" sz="2000" baseline="30000" dirty="0">
+                <a:latin typeface="Arial"/>
+                <a:cs typeface="Arial"/>
+              </a:rPr>
+              <a:t>st</a:t>
+            </a:r>
+            <a:r>
+              <a:rPr lang="en-GB" sz="2000" dirty="0">
+                <a:latin typeface="Arial"/>
+                <a:cs typeface="Arial"/>
+              </a:rPr>
+              <a:t> element, negative indices start from the last</a:t>
             </a:r>
           </a:p>
           <a:p>
             <a:pPr marL="342900" indent="-342900">
+              <a:spcBef>
+                <a:spcPts val="1200"/>
+              </a:spcBef>
               <a:buFont typeface="Arial"/>
               <a:buChar char="•"/>
             </a:pPr>
@@ -35879,6 +36785,9 @@
           </a:p>
           <a:p>
             <a:pPr marL="342900" indent="-342900">
+              <a:spcBef>
+                <a:spcPts val="1200"/>
+              </a:spcBef>
               <a:buFont typeface="Arial"/>
               <a:buChar char="•"/>
             </a:pPr>
@@ -35887,20 +36796,7 @@
                 <a:latin typeface="Arial"/>
                 <a:cs typeface="Arial"/>
               </a:rPr>
-              <a:t>This means that every element has two indexes (one counting forwards, one counting backwards)</a:t>
-            </a:r>
-          </a:p>
-          <a:p>
-            <a:pPr marL="342900" indent="-342900">
-              <a:buFont typeface="Arial"/>
-              <a:buChar char="•"/>
-            </a:pPr>
-            <a:r>
-              <a:rPr lang="en-GB" sz="2000" dirty="0">
-                <a:latin typeface="Arial"/>
-                <a:cs typeface="Arial"/>
-              </a:rPr>
-              <a:t>We often use negative indices when we don’t know the length of the list</a:t>
+              <a:t>Negative indexes are particularly useful when we don’t know the length of the list</a:t>
             </a:r>
           </a:p>
         </p:txBody>

</xml_diff>